<commit_message>
added lecture for version control part 1
</commit_message>
<xml_diff>
--- a/Wi18_content/SEDS/L3.Version_Control_p2.pptx
+++ b/Wi18_content/SEDS/L3.Version_Control_p2.pptx
@@ -5,37 +5,35 @@
     <p:sldMasterId id="2147483648" r:id="rId1"/>
   </p:sldMasterIdLst>
   <p:notesMasterIdLst>
-    <p:notesMasterId r:id="rId30"/>
+    <p:notesMasterId r:id="rId28"/>
   </p:notesMasterIdLst>
   <p:sldIdLst>
     <p:sldId id="256" r:id="rId2"/>
-    <p:sldId id="281" r:id="rId3"/>
-    <p:sldId id="296" r:id="rId4"/>
-    <p:sldId id="295" r:id="rId5"/>
-    <p:sldId id="282" r:id="rId6"/>
-    <p:sldId id="283" r:id="rId7"/>
-    <p:sldId id="284" r:id="rId8"/>
-    <p:sldId id="285" r:id="rId9"/>
-    <p:sldId id="287" r:id="rId10"/>
-    <p:sldId id="288" r:id="rId11"/>
-    <p:sldId id="289" r:id="rId12"/>
-    <p:sldId id="290" r:id="rId13"/>
-    <p:sldId id="291" r:id="rId14"/>
-    <p:sldId id="292" r:id="rId15"/>
-    <p:sldId id="293" r:id="rId16"/>
-    <p:sldId id="269" r:id="rId17"/>
-    <p:sldId id="270" r:id="rId18"/>
-    <p:sldId id="271" r:id="rId19"/>
-    <p:sldId id="272" r:id="rId20"/>
-    <p:sldId id="273" r:id="rId21"/>
-    <p:sldId id="274" r:id="rId22"/>
-    <p:sldId id="275" r:id="rId23"/>
-    <p:sldId id="276" r:id="rId24"/>
-    <p:sldId id="277" r:id="rId25"/>
-    <p:sldId id="278" r:id="rId26"/>
-    <p:sldId id="279" r:id="rId27"/>
-    <p:sldId id="280" r:id="rId28"/>
-    <p:sldId id="294" r:id="rId29"/>
+    <p:sldId id="295" r:id="rId3"/>
+    <p:sldId id="282" r:id="rId4"/>
+    <p:sldId id="283" r:id="rId5"/>
+    <p:sldId id="284" r:id="rId6"/>
+    <p:sldId id="285" r:id="rId7"/>
+    <p:sldId id="287" r:id="rId8"/>
+    <p:sldId id="288" r:id="rId9"/>
+    <p:sldId id="289" r:id="rId10"/>
+    <p:sldId id="290" r:id="rId11"/>
+    <p:sldId id="291" r:id="rId12"/>
+    <p:sldId id="292" r:id="rId13"/>
+    <p:sldId id="293" r:id="rId14"/>
+    <p:sldId id="269" r:id="rId15"/>
+    <p:sldId id="270" r:id="rId16"/>
+    <p:sldId id="271" r:id="rId17"/>
+    <p:sldId id="272" r:id="rId18"/>
+    <p:sldId id="273" r:id="rId19"/>
+    <p:sldId id="274" r:id="rId20"/>
+    <p:sldId id="275" r:id="rId21"/>
+    <p:sldId id="276" r:id="rId22"/>
+    <p:sldId id="277" r:id="rId23"/>
+    <p:sldId id="278" r:id="rId24"/>
+    <p:sldId id="279" r:id="rId25"/>
+    <p:sldId id="280" r:id="rId26"/>
+    <p:sldId id="294" r:id="rId27"/>
   </p:sldIdLst>
   <p:sldSz cx="9144000" cy="6858000" type="screen4x3"/>
   <p:notesSz cx="6858000" cy="9144000"/>
@@ -252,7 +250,7 @@
           <a:p>
             <a:fld id="{08F62E20-B1AA-3442-B8F1-F4A56998389D}" type="datetimeFigureOut">
               <a:rPr lang="en-US" smtClean="0"/>
-              <a:t>1/10/17</a:t>
+              <a:t>1/11/18</a:t>
             </a:fld>
             <a:endParaRPr lang="en-US"/>
           </a:p>
@@ -652,7 +650,7 @@
               <a:pPr>
                 <a:defRPr/>
               </a:pPr>
-              <a:t>24</a:t>
+              <a:t>22</a:t>
             </a:fld>
             <a:endParaRPr lang="en-US"/>
           </a:p>
@@ -679,7 +677,7 @@
           <a:ln/>
           <a:extLst>
             <a:ext uri="{AF507438-7753-43e0-B8FC-AC1667EBCBE1}">
-              <a14:hiddenEffects xmlns:a14="http://schemas.microsoft.com/office/drawing/2010/main" xmlns="">
+              <a14:hiddenEffects xmlns="" xmlns:a14="http://schemas.microsoft.com/office/drawing/2010/main">
                 <a:effectLst>
                   <a:outerShdw blurRad="63500" dist="38099" dir="2700000" algn="ctr" rotWithShape="0">
                     <a:srgbClr val="000000">
@@ -710,7 +708,7 @@
           <a:ln/>
           <a:extLst>
             <a:ext uri="{AF507438-7753-43e0-B8FC-AC1667EBCBE1}">
-              <a14:hiddenEffects xmlns:a14="http://schemas.microsoft.com/office/drawing/2010/main" xmlns="">
+              <a14:hiddenEffects xmlns="" xmlns:a14="http://schemas.microsoft.com/office/drawing/2010/main">
                 <a:effectLst>
                   <a:outerShdw blurRad="63500" dist="38099" dir="2700000" algn="ctr" rotWithShape="0">
                     <a:srgbClr val="000000">
@@ -796,7 +794,7 @@
               <a:pPr>
                 <a:defRPr/>
               </a:pPr>
-              <a:t>25</a:t>
+              <a:t>23</a:t>
             </a:fld>
             <a:endParaRPr lang="en-US"/>
           </a:p>
@@ -823,7 +821,7 @@
           <a:ln/>
           <a:extLst>
             <a:ext uri="{AF507438-7753-43e0-B8FC-AC1667EBCBE1}">
-              <a14:hiddenEffects xmlns:a14="http://schemas.microsoft.com/office/drawing/2010/main" xmlns="">
+              <a14:hiddenEffects xmlns="" xmlns:a14="http://schemas.microsoft.com/office/drawing/2010/main">
                 <a:effectLst>
                   <a:outerShdw blurRad="63500" dist="38099" dir="2700000" algn="ctr" rotWithShape="0">
                     <a:srgbClr val="000000">
@@ -854,7 +852,7 @@
           <a:ln/>
           <a:extLst>
             <a:ext uri="{AF507438-7753-43e0-B8FC-AC1667EBCBE1}">
-              <a14:hiddenEffects xmlns:a14="http://schemas.microsoft.com/office/drawing/2010/main" xmlns="">
+              <a14:hiddenEffects xmlns="" xmlns:a14="http://schemas.microsoft.com/office/drawing/2010/main">
                 <a:effectLst>
                   <a:outerShdw blurRad="63500" dist="38099" dir="2700000" algn="ctr" rotWithShape="0">
                     <a:srgbClr val="000000">
@@ -940,7 +938,7 @@
               <a:pPr>
                 <a:defRPr/>
               </a:pPr>
-              <a:t>26</a:t>
+              <a:t>24</a:t>
             </a:fld>
             <a:endParaRPr lang="en-US"/>
           </a:p>
@@ -967,7 +965,7 @@
           <a:ln/>
           <a:extLst>
             <a:ext uri="{AF507438-7753-43e0-B8FC-AC1667EBCBE1}">
-              <a14:hiddenEffects xmlns:a14="http://schemas.microsoft.com/office/drawing/2010/main" xmlns="">
+              <a14:hiddenEffects xmlns="" xmlns:a14="http://schemas.microsoft.com/office/drawing/2010/main">
                 <a:effectLst>
                   <a:outerShdw blurRad="63500" dist="38099" dir="2700000" algn="ctr" rotWithShape="0">
                     <a:srgbClr val="000000">
@@ -998,7 +996,7 @@
           <a:ln/>
           <a:extLst>
             <a:ext uri="{AF507438-7753-43e0-B8FC-AC1667EBCBE1}">
-              <a14:hiddenEffects xmlns:a14="http://schemas.microsoft.com/office/drawing/2010/main" xmlns="">
+              <a14:hiddenEffects xmlns="" xmlns:a14="http://schemas.microsoft.com/office/drawing/2010/main">
                 <a:effectLst>
                   <a:outerShdw blurRad="63500" dist="38099" dir="2700000" algn="ctr" rotWithShape="0">
                     <a:srgbClr val="000000">
@@ -1084,7 +1082,7 @@
               <a:pPr>
                 <a:defRPr/>
               </a:pPr>
-              <a:t>27</a:t>
+              <a:t>25</a:t>
             </a:fld>
             <a:endParaRPr lang="en-US"/>
           </a:p>
@@ -1111,7 +1109,7 @@
           <a:ln/>
           <a:extLst>
             <a:ext uri="{AF507438-7753-43e0-B8FC-AC1667EBCBE1}">
-              <a14:hiddenEffects xmlns:a14="http://schemas.microsoft.com/office/drawing/2010/main" xmlns="">
+              <a14:hiddenEffects xmlns="" xmlns:a14="http://schemas.microsoft.com/office/drawing/2010/main">
                 <a:effectLst>
                   <a:outerShdw blurRad="63500" dist="38099" dir="2700000" algn="ctr" rotWithShape="0">
                     <a:srgbClr val="000000">
@@ -1142,7 +1140,7 @@
           <a:ln/>
           <a:extLst>
             <a:ext uri="{AF507438-7753-43e0-B8FC-AC1667EBCBE1}">
-              <a14:hiddenEffects xmlns:a14="http://schemas.microsoft.com/office/drawing/2010/main" xmlns="">
+              <a14:hiddenEffects xmlns="" xmlns:a14="http://schemas.microsoft.com/office/drawing/2010/main">
                 <a:effectLst>
                   <a:outerShdw blurRad="63500" dist="38099" dir="2700000" algn="ctr" rotWithShape="0">
                     <a:srgbClr val="000000">
@@ -1228,7 +1226,7 @@
               <a:pPr>
                 <a:defRPr/>
               </a:pPr>
-              <a:t>16</a:t>
+              <a:t>14</a:t>
             </a:fld>
             <a:endParaRPr lang="en-US"/>
           </a:p>
@@ -1255,7 +1253,7 @@
           <a:ln/>
           <a:extLst>
             <a:ext uri="{AF507438-7753-43e0-B8FC-AC1667EBCBE1}">
-              <a14:hiddenEffects xmlns:a14="http://schemas.microsoft.com/office/drawing/2010/main" xmlns="">
+              <a14:hiddenEffects xmlns="" xmlns:a14="http://schemas.microsoft.com/office/drawing/2010/main">
                 <a:effectLst>
                   <a:outerShdw blurRad="63500" dist="38099" dir="2700000" algn="ctr" rotWithShape="0">
                     <a:srgbClr val="000000">
@@ -1286,7 +1284,7 @@
           <a:ln/>
           <a:extLst>
             <a:ext uri="{AF507438-7753-43e0-B8FC-AC1667EBCBE1}">
-              <a14:hiddenEffects xmlns:a14="http://schemas.microsoft.com/office/drawing/2010/main" xmlns="">
+              <a14:hiddenEffects xmlns="" xmlns:a14="http://schemas.microsoft.com/office/drawing/2010/main">
                 <a:effectLst>
                   <a:outerShdw blurRad="63500" dist="38099" dir="2700000" algn="ctr" rotWithShape="0">
                     <a:srgbClr val="000000">
@@ -1372,7 +1370,7 @@
               <a:pPr>
                 <a:defRPr/>
               </a:pPr>
-              <a:t>17</a:t>
+              <a:t>15</a:t>
             </a:fld>
             <a:endParaRPr lang="en-US"/>
           </a:p>
@@ -1399,7 +1397,7 @@
           <a:ln/>
           <a:extLst>
             <a:ext uri="{AF507438-7753-43e0-B8FC-AC1667EBCBE1}">
-              <a14:hiddenEffects xmlns:a14="http://schemas.microsoft.com/office/drawing/2010/main" xmlns="">
+              <a14:hiddenEffects xmlns="" xmlns:a14="http://schemas.microsoft.com/office/drawing/2010/main">
                 <a:effectLst>
                   <a:outerShdw blurRad="63500" dist="38099" dir="2700000" algn="ctr" rotWithShape="0">
                     <a:srgbClr val="000000">
@@ -1430,7 +1428,7 @@
           <a:ln/>
           <a:extLst>
             <a:ext uri="{AF507438-7753-43e0-B8FC-AC1667EBCBE1}">
-              <a14:hiddenEffects xmlns:a14="http://schemas.microsoft.com/office/drawing/2010/main" xmlns="">
+              <a14:hiddenEffects xmlns="" xmlns:a14="http://schemas.microsoft.com/office/drawing/2010/main">
                 <a:effectLst>
                   <a:outerShdw blurRad="63500" dist="38099" dir="2700000" algn="ctr" rotWithShape="0">
                     <a:srgbClr val="000000">
@@ -1516,7 +1514,7 @@
               <a:pPr>
                 <a:defRPr/>
               </a:pPr>
-              <a:t>18</a:t>
+              <a:t>16</a:t>
             </a:fld>
             <a:endParaRPr lang="en-US"/>
           </a:p>
@@ -1543,7 +1541,7 @@
           <a:ln/>
           <a:extLst>
             <a:ext uri="{AF507438-7753-43e0-B8FC-AC1667EBCBE1}">
-              <a14:hiddenEffects xmlns:a14="http://schemas.microsoft.com/office/drawing/2010/main" xmlns="">
+              <a14:hiddenEffects xmlns="" xmlns:a14="http://schemas.microsoft.com/office/drawing/2010/main">
                 <a:effectLst>
                   <a:outerShdw blurRad="63500" dist="38099" dir="2700000" algn="ctr" rotWithShape="0">
                     <a:srgbClr val="000000">
@@ -1574,7 +1572,7 @@
           <a:ln/>
           <a:extLst>
             <a:ext uri="{AF507438-7753-43e0-B8FC-AC1667EBCBE1}">
-              <a14:hiddenEffects xmlns:a14="http://schemas.microsoft.com/office/drawing/2010/main" xmlns="">
+              <a14:hiddenEffects xmlns="" xmlns:a14="http://schemas.microsoft.com/office/drawing/2010/main">
                 <a:effectLst>
                   <a:outerShdw blurRad="63500" dist="38099" dir="2700000" algn="ctr" rotWithShape="0">
                     <a:srgbClr val="000000">
@@ -1660,7 +1658,7 @@
               <a:pPr>
                 <a:defRPr/>
               </a:pPr>
-              <a:t>19</a:t>
+              <a:t>17</a:t>
             </a:fld>
             <a:endParaRPr lang="en-US"/>
           </a:p>
@@ -1687,7 +1685,7 @@
           <a:ln/>
           <a:extLst>
             <a:ext uri="{AF507438-7753-43e0-B8FC-AC1667EBCBE1}">
-              <a14:hiddenEffects xmlns:a14="http://schemas.microsoft.com/office/drawing/2010/main" xmlns="">
+              <a14:hiddenEffects xmlns="" xmlns:a14="http://schemas.microsoft.com/office/drawing/2010/main">
                 <a:effectLst>
                   <a:outerShdw blurRad="63500" dist="38099" dir="2700000" algn="ctr" rotWithShape="0">
                     <a:srgbClr val="000000">
@@ -1718,7 +1716,7 @@
           <a:ln/>
           <a:extLst>
             <a:ext uri="{AF507438-7753-43e0-B8FC-AC1667EBCBE1}">
-              <a14:hiddenEffects xmlns:a14="http://schemas.microsoft.com/office/drawing/2010/main" xmlns="">
+              <a14:hiddenEffects xmlns="" xmlns:a14="http://schemas.microsoft.com/office/drawing/2010/main">
                 <a:effectLst>
                   <a:outerShdw blurRad="63500" dist="38099" dir="2700000" algn="ctr" rotWithShape="0">
                     <a:srgbClr val="000000">
@@ -1804,7 +1802,7 @@
               <a:pPr>
                 <a:defRPr/>
               </a:pPr>
-              <a:t>20</a:t>
+              <a:t>18</a:t>
             </a:fld>
             <a:endParaRPr lang="en-US"/>
           </a:p>
@@ -1831,7 +1829,7 @@
           <a:ln/>
           <a:extLst>
             <a:ext uri="{AF507438-7753-43e0-B8FC-AC1667EBCBE1}">
-              <a14:hiddenEffects xmlns:a14="http://schemas.microsoft.com/office/drawing/2010/main" xmlns="">
+              <a14:hiddenEffects xmlns="" xmlns:a14="http://schemas.microsoft.com/office/drawing/2010/main">
                 <a:effectLst>
                   <a:outerShdw blurRad="63500" dist="38099" dir="2700000" algn="ctr" rotWithShape="0">
                     <a:srgbClr val="000000">
@@ -1862,7 +1860,7 @@
           <a:ln/>
           <a:extLst>
             <a:ext uri="{AF507438-7753-43e0-B8FC-AC1667EBCBE1}">
-              <a14:hiddenEffects xmlns:a14="http://schemas.microsoft.com/office/drawing/2010/main" xmlns="">
+              <a14:hiddenEffects xmlns="" xmlns:a14="http://schemas.microsoft.com/office/drawing/2010/main">
                 <a:effectLst>
                   <a:outerShdw blurRad="63500" dist="38099" dir="2700000" algn="ctr" rotWithShape="0">
                     <a:srgbClr val="000000">
@@ -1948,7 +1946,7 @@
               <a:pPr>
                 <a:defRPr/>
               </a:pPr>
-              <a:t>21</a:t>
+              <a:t>19</a:t>
             </a:fld>
             <a:endParaRPr lang="en-US"/>
           </a:p>
@@ -1975,7 +1973,7 @@
           <a:ln/>
           <a:extLst>
             <a:ext uri="{AF507438-7753-43e0-B8FC-AC1667EBCBE1}">
-              <a14:hiddenEffects xmlns:a14="http://schemas.microsoft.com/office/drawing/2010/main" xmlns="">
+              <a14:hiddenEffects xmlns="" xmlns:a14="http://schemas.microsoft.com/office/drawing/2010/main">
                 <a:effectLst>
                   <a:outerShdw blurRad="63500" dist="38099" dir="2700000" algn="ctr" rotWithShape="0">
                     <a:srgbClr val="000000">
@@ -2006,7 +2004,7 @@
           <a:ln/>
           <a:extLst>
             <a:ext uri="{AF507438-7753-43e0-B8FC-AC1667EBCBE1}">
-              <a14:hiddenEffects xmlns:a14="http://schemas.microsoft.com/office/drawing/2010/main" xmlns="">
+              <a14:hiddenEffects xmlns="" xmlns:a14="http://schemas.microsoft.com/office/drawing/2010/main">
                 <a:effectLst>
                   <a:outerShdw blurRad="63500" dist="38099" dir="2700000" algn="ctr" rotWithShape="0">
                     <a:srgbClr val="000000">
@@ -2092,7 +2090,7 @@
               <a:pPr>
                 <a:defRPr/>
               </a:pPr>
-              <a:t>22</a:t>
+              <a:t>20</a:t>
             </a:fld>
             <a:endParaRPr lang="en-US"/>
           </a:p>
@@ -2119,7 +2117,7 @@
           <a:ln/>
           <a:extLst>
             <a:ext uri="{AF507438-7753-43e0-B8FC-AC1667EBCBE1}">
-              <a14:hiddenEffects xmlns:a14="http://schemas.microsoft.com/office/drawing/2010/main" xmlns="">
+              <a14:hiddenEffects xmlns="" xmlns:a14="http://schemas.microsoft.com/office/drawing/2010/main">
                 <a:effectLst>
                   <a:outerShdw blurRad="63500" dist="38099" dir="2700000" algn="ctr" rotWithShape="0">
                     <a:srgbClr val="000000">
@@ -2150,7 +2148,7 @@
           <a:ln/>
           <a:extLst>
             <a:ext uri="{AF507438-7753-43e0-B8FC-AC1667EBCBE1}">
-              <a14:hiddenEffects xmlns:a14="http://schemas.microsoft.com/office/drawing/2010/main" xmlns="">
+              <a14:hiddenEffects xmlns="" xmlns:a14="http://schemas.microsoft.com/office/drawing/2010/main">
                 <a:effectLst>
                   <a:outerShdw blurRad="63500" dist="38099" dir="2700000" algn="ctr" rotWithShape="0">
                     <a:srgbClr val="000000">
@@ -2236,7 +2234,7 @@
               <a:pPr>
                 <a:defRPr/>
               </a:pPr>
-              <a:t>23</a:t>
+              <a:t>21</a:t>
             </a:fld>
             <a:endParaRPr lang="en-US"/>
           </a:p>
@@ -2263,7 +2261,7 @@
           <a:ln/>
           <a:extLst>
             <a:ext uri="{AF507438-7753-43e0-B8FC-AC1667EBCBE1}">
-              <a14:hiddenEffects xmlns:a14="http://schemas.microsoft.com/office/drawing/2010/main" xmlns="">
+              <a14:hiddenEffects xmlns="" xmlns:a14="http://schemas.microsoft.com/office/drawing/2010/main">
                 <a:effectLst>
                   <a:outerShdw blurRad="63500" dist="38099" dir="2700000" algn="ctr" rotWithShape="0">
                     <a:srgbClr val="000000">
@@ -2294,7 +2292,7 @@
           <a:ln/>
           <a:extLst>
             <a:ext uri="{AF507438-7753-43e0-B8FC-AC1667EBCBE1}">
-              <a14:hiddenEffects xmlns:a14="http://schemas.microsoft.com/office/drawing/2010/main" xmlns="">
+              <a14:hiddenEffects xmlns="" xmlns:a14="http://schemas.microsoft.com/office/drawing/2010/main">
                 <a:effectLst>
                   <a:outerShdw blurRad="63500" dist="38099" dir="2700000" algn="ctr" rotWithShape="0">
                     <a:srgbClr val="000000">
@@ -2521,7 +2519,7 @@
           <a:p>
             <a:fld id="{2691D6E4-0F7A-0249-86EF-226720E50E4C}" type="datetimeFigureOut">
               <a:rPr lang="en-US" smtClean="0"/>
-              <a:t>1/10/17</a:t>
+              <a:t>1/11/18</a:t>
             </a:fld>
             <a:endParaRPr lang="en-US"/>
           </a:p>
@@ -2715,7 +2713,7 @@
           <a:p>
             <a:fld id="{2691D6E4-0F7A-0249-86EF-226720E50E4C}" type="datetimeFigureOut">
               <a:rPr lang="en-US" smtClean="0"/>
-              <a:t>1/10/17</a:t>
+              <a:t>1/11/18</a:t>
             </a:fld>
             <a:endParaRPr lang="en-US"/>
           </a:p>
@@ -2919,7 +2917,7 @@
           <a:p>
             <a:fld id="{2691D6E4-0F7A-0249-86EF-226720E50E4C}" type="datetimeFigureOut">
               <a:rPr lang="en-US" smtClean="0"/>
-              <a:t>1/10/17</a:t>
+              <a:t>1/11/18</a:t>
             </a:fld>
             <a:endParaRPr lang="en-US"/>
           </a:p>
@@ -3113,7 +3111,7 @@
           <a:p>
             <a:fld id="{2691D6E4-0F7A-0249-86EF-226720E50E4C}" type="datetimeFigureOut">
               <a:rPr lang="en-US" smtClean="0"/>
-              <a:t>1/10/17</a:t>
+              <a:t>1/11/18</a:t>
             </a:fld>
             <a:endParaRPr lang="en-US"/>
           </a:p>
@@ -3383,7 +3381,7 @@
           <a:p>
             <a:fld id="{2691D6E4-0F7A-0249-86EF-226720E50E4C}" type="datetimeFigureOut">
               <a:rPr lang="en-US" smtClean="0"/>
-              <a:t>1/10/17</a:t>
+              <a:t>1/11/18</a:t>
             </a:fld>
             <a:endParaRPr lang="en-US"/>
           </a:p>
@@ -3695,7 +3693,7 @@
           <a:p>
             <a:fld id="{2691D6E4-0F7A-0249-86EF-226720E50E4C}" type="datetimeFigureOut">
               <a:rPr lang="en-US" smtClean="0"/>
-              <a:t>1/10/17</a:t>
+              <a:t>1/11/18</a:t>
             </a:fld>
             <a:endParaRPr lang="en-US"/>
           </a:p>
@@ -4141,7 +4139,7 @@
           <a:p>
             <a:fld id="{2691D6E4-0F7A-0249-86EF-226720E50E4C}" type="datetimeFigureOut">
               <a:rPr lang="en-US" smtClean="0"/>
-              <a:t>1/10/17</a:t>
+              <a:t>1/11/18</a:t>
             </a:fld>
             <a:endParaRPr lang="en-US"/>
           </a:p>
@@ -4283,7 +4281,7 @@
           <a:p>
             <a:fld id="{2691D6E4-0F7A-0249-86EF-226720E50E4C}" type="datetimeFigureOut">
               <a:rPr lang="en-US" smtClean="0"/>
-              <a:t>1/10/17</a:t>
+              <a:t>1/11/18</a:t>
             </a:fld>
             <a:endParaRPr lang="en-US"/>
           </a:p>
@@ -4402,7 +4400,7 @@
           <a:p>
             <a:fld id="{2691D6E4-0F7A-0249-86EF-226720E50E4C}" type="datetimeFigureOut">
               <a:rPr lang="en-US" smtClean="0"/>
-              <a:t>1/10/17</a:t>
+              <a:t>1/11/18</a:t>
             </a:fld>
             <a:endParaRPr lang="en-US"/>
           </a:p>
@@ -4703,7 +4701,7 @@
           <a:p>
             <a:fld id="{2691D6E4-0F7A-0249-86EF-226720E50E4C}" type="datetimeFigureOut">
               <a:rPr lang="en-US" smtClean="0"/>
-              <a:t>1/10/17</a:t>
+              <a:t>1/11/18</a:t>
             </a:fld>
             <a:endParaRPr lang="en-US"/>
           </a:p>
@@ -4980,7 +4978,7 @@
           <a:p>
             <a:fld id="{2691D6E4-0F7A-0249-86EF-226720E50E4C}" type="datetimeFigureOut">
               <a:rPr lang="en-US" smtClean="0"/>
-              <a:t>1/10/17</a:t>
+              <a:t>1/11/18</a:t>
             </a:fld>
             <a:endParaRPr lang="en-US"/>
           </a:p>
@@ -6128,91 +6126,114 @@
           <a:bodyPr/>
           <a:lstStyle/>
           <a:p>
-            <a:pPr>
-              <a:spcBef>
-                <a:spcPts val="800"/>
-              </a:spcBef>
-              <a:buFont typeface="Arial" charset="0"/>
-              <a:buChar char="•"/>
-              <a:defRPr/>
-            </a:pPr>
-            <a:r>
-              <a:rPr lang="en-US" dirty="0">
-                <a:latin typeface="Calibri" charset="0"/>
+            <a:endParaRPr lang="en-US"/>
+          </a:p>
+        </p:txBody>
+      </p:sp>
+      <p:pic>
+        <p:nvPicPr>
+          <p:cNvPr id="4" name="Picture 3"/>
+          <p:cNvPicPr>
+            <a:picLocks noChangeAspect="1"/>
+          </p:cNvPicPr>
+          <p:nvPr/>
+        </p:nvPicPr>
+        <p:blipFill>
+          <a:blip r:embed="rId2"/>
+          <a:stretch>
+            <a:fillRect/>
+          </a:stretch>
+        </p:blipFill>
+        <p:spPr>
+          <a:xfrm>
+            <a:off x="2133600" y="1717072"/>
+            <a:ext cx="4876800" cy="4940300"/>
+          </a:xfrm>
+          <a:prstGeom prst="rect">
+            <a:avLst/>
+          </a:prstGeom>
+        </p:spPr>
+      </p:pic>
+      <p:sp>
+        <p:nvSpPr>
+          <p:cNvPr id="5" name="TextBox 4"/>
+          <p:cNvSpPr txBox="1"/>
+          <p:nvPr/>
+        </p:nvSpPr>
+        <p:spPr>
+          <a:xfrm>
+            <a:off x="1219200" y="2364772"/>
+            <a:ext cx="868597" cy="461665"/>
+          </a:xfrm>
+          <a:prstGeom prst="rect">
+            <a:avLst/>
+          </a:prstGeom>
+          <a:noFill/>
+        </p:spPr>
+        <p:txBody>
+          <a:bodyPr wrap="none" rtlCol="0">
+            <a:spAutoFit/>
+          </a:bodyPr>
+          <a:lstStyle/>
+          <a:p>
+            <a:r>
+              <a:rPr lang="en-US" dirty="0" smtClean="0">
+                <a:solidFill>
+                  <a:schemeClr val="tx1"/>
+                </a:solidFill>
               </a:rPr>
-              <a:t>You are developing software with other people</a:t>
-            </a:r>
-          </a:p>
-          <a:p>
-            <a:pPr lvl="1">
-              <a:spcBef>
-                <a:spcPts val="800"/>
-              </a:spcBef>
-              <a:buFont typeface="Arial" charset="0"/>
-              <a:buChar char="•"/>
-              <a:defRPr/>
-            </a:pPr>
-            <a:r>
-              <a:rPr lang="en-US" sz="3200" dirty="0">
-                <a:latin typeface="Calibri" charset="0"/>
+              <a:t>Mary</a:t>
+            </a:r>
+            <a:endParaRPr lang="en-US" dirty="0">
+              <a:solidFill>
+                <a:schemeClr val="tx1"/>
+              </a:solidFill>
+            </a:endParaRPr>
+          </a:p>
+        </p:txBody>
+      </p:sp>
+      <p:sp>
+        <p:nvSpPr>
+          <p:cNvPr id="6" name="TextBox 5"/>
+          <p:cNvSpPr txBox="1"/>
+          <p:nvPr/>
+        </p:nvSpPr>
+        <p:spPr>
+          <a:xfrm>
+            <a:off x="1219200" y="4650772"/>
+            <a:ext cx="864590" cy="461665"/>
+          </a:xfrm>
+          <a:prstGeom prst="rect">
+            <a:avLst/>
+          </a:prstGeom>
+          <a:noFill/>
+        </p:spPr>
+        <p:txBody>
+          <a:bodyPr wrap="none" rtlCol="0">
+            <a:spAutoFit/>
+          </a:bodyPr>
+          <a:lstStyle/>
+          <a:p>
+            <a:r>
+              <a:rPr lang="en-US" dirty="0" smtClean="0">
+                <a:solidFill>
+                  <a:schemeClr val="tx1"/>
+                </a:solidFill>
               </a:rPr>
-              <a:t>You want to be able to identify and resolve conflicts during code development</a:t>
-            </a:r>
-          </a:p>
-          <a:p>
-            <a:pPr lvl="2">
-              <a:spcBef>
-                <a:spcPts val="800"/>
-              </a:spcBef>
-              <a:buFont typeface="Arial" charset="0"/>
-              <a:buChar char="•"/>
-              <a:defRPr/>
-            </a:pPr>
-            <a:r>
-              <a:rPr lang="en-US" sz="3200" dirty="0">
-                <a:latin typeface="Calibri" charset="0"/>
-              </a:rPr>
-              <a:t>Two people working on the same function at the same time</a:t>
-            </a:r>
-          </a:p>
-          <a:p>
-            <a:pPr lvl="1">
-              <a:spcBef>
-                <a:spcPts val="800"/>
-              </a:spcBef>
-              <a:buFont typeface="Arial" charset="0"/>
-              <a:buChar char="•"/>
-              <a:defRPr/>
-            </a:pPr>
-            <a:r>
-              <a:rPr lang="en-US" sz="3200" dirty="0">
-                <a:latin typeface="Calibri" charset="0"/>
-              </a:rPr>
-              <a:t>You need to be able to identify who is responsible for what pieces of code</a:t>
-            </a:r>
-          </a:p>
-          <a:p>
-            <a:pPr lvl="2">
-              <a:spcBef>
-                <a:spcPts val="800"/>
-              </a:spcBef>
-              <a:buFont typeface="Arial" charset="0"/>
-              <a:buChar char="•"/>
-              <a:defRPr/>
-            </a:pPr>
-            <a:endParaRPr lang="en-US" sz="3200" dirty="0">
-              <a:latin typeface="Calibri" charset="0"/>
+              <a:t>Alice</a:t>
+            </a:r>
+            <a:endParaRPr lang="en-US" dirty="0">
+              <a:solidFill>
+                <a:schemeClr val="tx1"/>
+              </a:solidFill>
             </a:endParaRPr>
-          </a:p>
-          <a:p>
-            <a:endParaRPr lang="en-US" dirty="0"/>
           </a:p>
         </p:txBody>
       </p:sp>
     </p:spTree>
     <p:extLst>
       <p:ext uri="{BB962C8B-B14F-4D97-AF65-F5344CB8AC3E}">
-        <p14:creationId xmlns:p14="http://schemas.microsoft.com/office/powerpoint/2010/main" val="99088052"/>
+        <p14:creationId xmlns:p14="http://schemas.microsoft.com/office/powerpoint/2010/main" val="594885862"/>
       </p:ext>
     </p:extLst>
   </p:cSld>
@@ -6256,7 +6277,7 @@
           <a:p>
             <a:r>
               <a:rPr lang="en-US" dirty="0" smtClean="0"/>
-              <a:t>Why do I need version control?</a:t>
+              <a:t>Why else?</a:t>
             </a:r>
             <a:endParaRPr lang="en-US" dirty="0"/>
           </a:p>
@@ -6277,38 +6298,46 @@
           <a:bodyPr/>
           <a:lstStyle/>
           <a:p>
-            <a:endParaRPr lang="en-US"/>
-          </a:p>
-        </p:txBody>
-      </p:sp>
-      <p:pic>
-        <p:nvPicPr>
-          <p:cNvPr id="4" name="Picture 3"/>
-          <p:cNvPicPr>
-            <a:picLocks noChangeAspect="1"/>
-          </p:cNvPicPr>
-          <p:nvPr/>
-        </p:nvPicPr>
-        <p:blipFill>
-          <a:blip r:embed="rId2"/>
-          <a:stretch>
-            <a:fillRect/>
-          </a:stretch>
-        </p:blipFill>
-        <p:spPr>
-          <a:xfrm>
-            <a:off x="2254250" y="1747536"/>
-            <a:ext cx="4635500" cy="4762500"/>
-          </a:xfrm>
-          <a:prstGeom prst="rect">
-            <a:avLst/>
-          </a:prstGeom>
-        </p:spPr>
-      </p:pic>
+            <a:pPr>
+              <a:spcBef>
+                <a:spcPts val="800"/>
+              </a:spcBef>
+              <a:buFont typeface="Arial" charset="0"/>
+              <a:buChar char="•"/>
+              <a:defRPr/>
+            </a:pPr>
+            <a:r>
+              <a:rPr lang="en-US" dirty="0">
+                <a:latin typeface="Calibri" charset="0"/>
+              </a:rPr>
+              <a:t>You want a job</a:t>
+            </a:r>
+          </a:p>
+          <a:p>
+            <a:pPr lvl="1">
+              <a:spcBef>
+                <a:spcPts val="800"/>
+              </a:spcBef>
+              <a:buFont typeface="Arial" charset="0"/>
+              <a:buChar char="•"/>
+              <a:defRPr/>
+            </a:pPr>
+            <a:r>
+              <a:rPr lang="en-US" sz="3200" dirty="0">
+                <a:latin typeface="Calibri" charset="0"/>
+              </a:rPr>
+              <a:t>No one will hire a software developer that doesn’t know how to use version control</a:t>
+            </a:r>
+          </a:p>
+          <a:p>
+            <a:endParaRPr lang="en-US" dirty="0"/>
+          </a:p>
+        </p:txBody>
+      </p:sp>
     </p:spTree>
     <p:extLst>
       <p:ext uri="{BB962C8B-B14F-4D97-AF65-F5344CB8AC3E}">
-        <p14:creationId xmlns:p14="http://schemas.microsoft.com/office/powerpoint/2010/main" val="261644260"/>
+        <p14:creationId xmlns:p14="http://schemas.microsoft.com/office/powerpoint/2010/main" val="591837602"/>
       </p:ext>
     </p:extLst>
   </p:cSld>
@@ -6352,7 +6381,15 @@
           <a:p>
             <a:r>
               <a:rPr lang="en-US" dirty="0" smtClean="0"/>
-              <a:t>Why do I need version control?</a:t>
+              <a:t>What is </a:t>
+            </a:r>
+            <a:r>
+              <a:rPr lang="en-US" dirty="0" err="1" smtClean="0"/>
+              <a:t>git</a:t>
+            </a:r>
+            <a:r>
+              <a:rPr lang="en-US" dirty="0" smtClean="0"/>
+              <a:t>?</a:t>
             </a:r>
             <a:endParaRPr lang="en-US" dirty="0"/>
           </a:p>
@@ -6373,114 +6410,131 @@
           <a:bodyPr/>
           <a:lstStyle/>
           <a:p>
-            <a:endParaRPr lang="en-US"/>
-          </a:p>
-        </p:txBody>
-      </p:sp>
-      <p:pic>
-        <p:nvPicPr>
-          <p:cNvPr id="4" name="Picture 3"/>
-          <p:cNvPicPr>
-            <a:picLocks noChangeAspect="1"/>
-          </p:cNvPicPr>
-          <p:nvPr/>
-        </p:nvPicPr>
-        <p:blipFill>
-          <a:blip r:embed="rId2"/>
-          <a:stretch>
-            <a:fillRect/>
-          </a:stretch>
-        </p:blipFill>
-        <p:spPr>
-          <a:xfrm>
-            <a:off x="2133600" y="1717072"/>
-            <a:ext cx="4876800" cy="4940300"/>
-          </a:xfrm>
-          <a:prstGeom prst="rect">
-            <a:avLst/>
-          </a:prstGeom>
-        </p:spPr>
-      </p:pic>
-      <p:sp>
-        <p:nvSpPr>
-          <p:cNvPr id="5" name="TextBox 4"/>
-          <p:cNvSpPr txBox="1"/>
-          <p:nvPr/>
-        </p:nvSpPr>
-        <p:spPr>
-          <a:xfrm>
-            <a:off x="1219200" y="2364772"/>
-            <a:ext cx="868597" cy="461665"/>
-          </a:xfrm>
-          <a:prstGeom prst="rect">
-            <a:avLst/>
-          </a:prstGeom>
-          <a:noFill/>
-        </p:spPr>
-        <p:txBody>
-          <a:bodyPr wrap="none" rtlCol="0">
-            <a:spAutoFit/>
-          </a:bodyPr>
-          <a:lstStyle/>
-          <a:p>
-            <a:r>
-              <a:rPr lang="en-US" dirty="0" smtClean="0">
-                <a:solidFill>
-                  <a:schemeClr val="tx1"/>
-                </a:solidFill>
+            <a:pPr>
+              <a:spcBef>
+                <a:spcPts val="800"/>
+              </a:spcBef>
+              <a:buFont typeface="Arial" charset="0"/>
+              <a:buChar char="•"/>
+              <a:defRPr/>
+            </a:pPr>
+            <a:r>
+              <a:rPr lang="en-US" dirty="0" err="1">
+                <a:latin typeface="Calibri" charset="0"/>
               </a:rPr>
-              <a:t>Mary</a:t>
-            </a:r>
+              <a:t>Git</a:t>
+            </a:r>
+            <a:r>
+              <a:rPr lang="en-US" dirty="0">
+                <a:latin typeface="Calibri" charset="0"/>
+              </a:rPr>
+              <a:t> is the most popular version control software</a:t>
+            </a:r>
+          </a:p>
+          <a:p>
+            <a:pPr>
+              <a:spcBef>
+                <a:spcPts val="800"/>
+              </a:spcBef>
+              <a:buFont typeface="Arial" charset="0"/>
+              <a:buChar char="•"/>
+              <a:defRPr/>
+            </a:pPr>
+            <a:r>
+              <a:rPr lang="en-US" dirty="0" err="1">
+                <a:latin typeface="Calibri" charset="0"/>
+              </a:rPr>
+              <a:t>Git</a:t>
+            </a:r>
+            <a:r>
+              <a:rPr lang="en-US" dirty="0">
+                <a:latin typeface="Calibri" charset="0"/>
+              </a:rPr>
+              <a:t> is open source</a:t>
+            </a:r>
+          </a:p>
+          <a:p>
+            <a:pPr>
+              <a:spcBef>
+                <a:spcPts val="800"/>
+              </a:spcBef>
+              <a:buFont typeface="Arial" charset="0"/>
+              <a:buChar char="•"/>
+              <a:defRPr/>
+            </a:pPr>
+            <a:r>
+              <a:rPr lang="en-US" dirty="0" err="1">
+                <a:latin typeface="Calibri" charset="0"/>
+              </a:rPr>
+              <a:t>Git</a:t>
+            </a:r>
+            <a:r>
+              <a:rPr lang="en-US" dirty="0">
+                <a:latin typeface="Calibri" charset="0"/>
+              </a:rPr>
+              <a:t> runs on every platform</a:t>
+            </a:r>
+          </a:p>
+          <a:p>
+            <a:pPr lvl="1">
+              <a:spcBef>
+                <a:spcPts val="800"/>
+              </a:spcBef>
+              <a:buFont typeface="Arial" charset="0"/>
+              <a:buChar char="•"/>
+              <a:defRPr/>
+            </a:pPr>
+            <a:r>
+              <a:rPr lang="en-US" sz="3200" dirty="0">
+                <a:latin typeface="Calibri" charset="0"/>
+              </a:rPr>
+              <a:t>even Plan 9 From Outer Space</a:t>
+            </a:r>
+          </a:p>
+          <a:p>
+            <a:pPr>
+              <a:spcBef>
+                <a:spcPts val="800"/>
+              </a:spcBef>
+              <a:buFont typeface="Arial" charset="0"/>
+              <a:buChar char="•"/>
+              <a:defRPr/>
+            </a:pPr>
+            <a:r>
+              <a:rPr lang="en-US" dirty="0" err="1">
+                <a:latin typeface="Calibri" charset="0"/>
+              </a:rPr>
+              <a:t>Git</a:t>
+            </a:r>
+            <a:r>
+              <a:rPr lang="en-US" dirty="0">
+                <a:latin typeface="Calibri" charset="0"/>
+              </a:rPr>
+              <a:t> is better than all previous version control tools (in my opinion, and I’ve used quite a few)</a:t>
+            </a:r>
+          </a:p>
+          <a:p>
+            <a:pPr>
+              <a:spcBef>
+                <a:spcPts val="800"/>
+              </a:spcBef>
+              <a:buFont typeface="Arial" charset="0"/>
+              <a:buChar char="•"/>
+              <a:defRPr/>
+            </a:pPr>
             <a:endParaRPr lang="en-US" dirty="0">
-              <a:solidFill>
-                <a:schemeClr val="tx1"/>
-              </a:solidFill>
+              <a:latin typeface="Calibri" charset="0"/>
             </a:endParaRPr>
           </a:p>
-        </p:txBody>
-      </p:sp>
-      <p:sp>
-        <p:nvSpPr>
-          <p:cNvPr id="6" name="TextBox 5"/>
-          <p:cNvSpPr txBox="1"/>
-          <p:nvPr/>
-        </p:nvSpPr>
-        <p:spPr>
-          <a:xfrm>
-            <a:off x="1219200" y="4650772"/>
-            <a:ext cx="864590" cy="461665"/>
-          </a:xfrm>
-          <a:prstGeom prst="rect">
-            <a:avLst/>
-          </a:prstGeom>
-          <a:noFill/>
-        </p:spPr>
-        <p:txBody>
-          <a:bodyPr wrap="none" rtlCol="0">
-            <a:spAutoFit/>
-          </a:bodyPr>
-          <a:lstStyle/>
-          <a:p>
-            <a:r>
-              <a:rPr lang="en-US" dirty="0" smtClean="0">
-                <a:solidFill>
-                  <a:schemeClr val="tx1"/>
-                </a:solidFill>
-              </a:rPr>
-              <a:t>Alice</a:t>
-            </a:r>
-            <a:endParaRPr lang="en-US" dirty="0">
-              <a:solidFill>
-                <a:schemeClr val="tx1"/>
-              </a:solidFill>
-            </a:endParaRPr>
+          <a:p>
+            <a:endParaRPr lang="en-US" dirty="0"/>
           </a:p>
         </p:txBody>
       </p:sp>
     </p:spTree>
     <p:extLst>
       <p:ext uri="{BB962C8B-B14F-4D97-AF65-F5344CB8AC3E}">
-        <p14:creationId xmlns:p14="http://schemas.microsoft.com/office/powerpoint/2010/main" val="594885862"/>
+        <p14:creationId xmlns:p14="http://schemas.microsoft.com/office/powerpoint/2010/main" val="503709198"/>
       </p:ext>
     </p:extLst>
   </p:cSld>
@@ -6524,7 +6578,7 @@
           <a:p>
             <a:r>
               <a:rPr lang="en-US" dirty="0" smtClean="0"/>
-              <a:t>Why else?</a:t>
+              <a:t>What is GitHub?</a:t>
             </a:r>
             <a:endParaRPr lang="en-US" dirty="0"/>
           </a:p>
@@ -6557,7 +6611,19 @@
               <a:rPr lang="en-US" dirty="0">
                 <a:latin typeface="Calibri" charset="0"/>
               </a:rPr>
-              <a:t>You want a job</a:t>
+              <a:t>‘</a:t>
+            </a:r>
+            <a:r>
+              <a:rPr lang="en-US" dirty="0" err="1">
+                <a:latin typeface="Calibri" charset="0"/>
+              </a:rPr>
+              <a:t>Git</a:t>
+            </a:r>
+            <a:r>
+              <a:rPr lang="en-US" dirty="0">
+                <a:latin typeface="Calibri" charset="0"/>
+              </a:rPr>
+              <a:t> in the cloud’</a:t>
             </a:r>
           </a:p>
           <a:p>
@@ -6573,7 +6639,76 @@
               <a:rPr lang="en-US" sz="3200" dirty="0">
                 <a:latin typeface="Calibri" charset="0"/>
               </a:rPr>
-              <a:t>No one will hire a software developer that doesn’t know how to use version control</a:t>
+              <a:t>Your </a:t>
+            </a:r>
+            <a:r>
+              <a:rPr lang="en-US" sz="3200" dirty="0" err="1">
+                <a:latin typeface="Calibri" charset="0"/>
+              </a:rPr>
+              <a:t>git</a:t>
+            </a:r>
+            <a:r>
+              <a:rPr lang="en-US" sz="3200" dirty="0">
+                <a:latin typeface="Calibri" charset="0"/>
+              </a:rPr>
+              <a:t> repository lives on </a:t>
+            </a:r>
+            <a:r>
+              <a:rPr lang="en-US" sz="3200" dirty="0" err="1">
+                <a:latin typeface="Calibri" charset="0"/>
+              </a:rPr>
+              <a:t>GitHub.com</a:t>
+            </a:r>
+            <a:endParaRPr lang="en-US" sz="3200" dirty="0">
+              <a:latin typeface="Calibri" charset="0"/>
+            </a:endParaRPr>
+          </a:p>
+          <a:p>
+            <a:pPr lvl="1">
+              <a:spcBef>
+                <a:spcPts val="800"/>
+              </a:spcBef>
+              <a:buFont typeface="Arial" charset="0"/>
+              <a:buChar char="•"/>
+              <a:defRPr/>
+            </a:pPr>
+            <a:r>
+              <a:rPr lang="en-US" sz="3200" dirty="0">
+                <a:latin typeface="Calibri" charset="0"/>
+              </a:rPr>
+              <a:t>Other people can download and use your code</a:t>
+            </a:r>
+          </a:p>
+          <a:p>
+            <a:pPr lvl="1">
+              <a:spcBef>
+                <a:spcPts val="800"/>
+              </a:spcBef>
+              <a:buFont typeface="Arial" charset="0"/>
+              <a:buChar char="•"/>
+              <a:defRPr/>
+            </a:pPr>
+            <a:r>
+              <a:rPr lang="en-US" sz="3200" dirty="0">
+                <a:latin typeface="Calibri" charset="0"/>
+              </a:rPr>
+              <a:t>There is an issue tracker for your code</a:t>
+            </a:r>
+          </a:p>
+          <a:p>
+            <a:pPr lvl="1">
+              <a:spcBef>
+                <a:spcPts val="800"/>
+              </a:spcBef>
+              <a:buFont typeface="Arial" charset="0"/>
+              <a:buChar char="•"/>
+              <a:defRPr/>
+            </a:pPr>
+            <a:r>
+              <a:rPr lang="en-US" sz="3200" dirty="0">
+                <a:latin typeface="Calibri" charset="0"/>
+              </a:rPr>
+              <a:t>You can develop code collaboratively using GitHub</a:t>
             </a:r>
           </a:p>
           <a:p>
@@ -6584,7 +6719,7 @@
     </p:spTree>
     <p:extLst>
       <p:ext uri="{BB962C8B-B14F-4D97-AF65-F5344CB8AC3E}">
-        <p14:creationId xmlns:p14="http://schemas.microsoft.com/office/powerpoint/2010/main" val="591837602"/>
+        <p14:creationId xmlns:p14="http://schemas.microsoft.com/office/powerpoint/2010/main" val="1819760004"/>
       </p:ext>
     </p:extLst>
   </p:cSld>
@@ -6611,183 +6746,68 @@
           <a:chExt cx="0" cy="0"/>
         </a:xfrm>
       </p:grpSpPr>
-      <p:sp>
-        <p:nvSpPr>
-          <p:cNvPr id="2" name="Title 1"/>
-          <p:cNvSpPr>
-            <a:spLocks noGrp="1"/>
-          </p:cNvSpPr>
-          <p:nvPr>
-            <p:ph type="title"/>
-          </p:nvPr>
-        </p:nvSpPr>
-        <p:spPr/>
-        <p:txBody>
-          <a:bodyPr/>
-          <a:lstStyle/>
-          <a:p>
-            <a:r>
-              <a:rPr lang="en-US" dirty="0" smtClean="0"/>
-              <a:t>What is </a:t>
-            </a:r>
-            <a:r>
-              <a:rPr lang="en-US" dirty="0" err="1" smtClean="0"/>
-              <a:t>git</a:t>
-            </a:r>
-            <a:r>
-              <a:rPr lang="en-US" dirty="0" smtClean="0"/>
-              <a:t>?</a:t>
-            </a:r>
-            <a:endParaRPr lang="en-US" dirty="0"/>
-          </a:p>
-        </p:txBody>
-      </p:sp>
-      <p:sp>
-        <p:nvSpPr>
-          <p:cNvPr id="3" name="Content Placeholder 2"/>
-          <p:cNvSpPr>
-            <a:spLocks noGrp="1"/>
-          </p:cNvSpPr>
-          <p:nvPr>
-            <p:ph idx="1"/>
-          </p:nvPr>
-        </p:nvSpPr>
-        <p:spPr/>
-        <p:txBody>
-          <a:bodyPr/>
-          <a:lstStyle/>
-          <a:p>
-            <a:pPr>
-              <a:spcBef>
-                <a:spcPts val="800"/>
-              </a:spcBef>
-              <a:buFont typeface="Arial" charset="0"/>
-              <a:buChar char="•"/>
-              <a:defRPr/>
-            </a:pPr>
-            <a:r>
-              <a:rPr lang="en-US" dirty="0" err="1">
-                <a:latin typeface="Calibri" charset="0"/>
-              </a:rPr>
-              <a:t>Git</a:t>
-            </a:r>
-            <a:r>
-              <a:rPr lang="en-US" dirty="0">
-                <a:latin typeface="Calibri" charset="0"/>
-              </a:rPr>
-              <a:t> is the most popular version control software</a:t>
-            </a:r>
-          </a:p>
-          <a:p>
-            <a:pPr>
-              <a:spcBef>
-                <a:spcPts val="800"/>
-              </a:spcBef>
-              <a:buFont typeface="Arial" charset="0"/>
-              <a:buChar char="•"/>
-              <a:defRPr/>
-            </a:pPr>
-            <a:r>
-              <a:rPr lang="en-US" dirty="0" err="1">
-                <a:latin typeface="Calibri" charset="0"/>
-              </a:rPr>
-              <a:t>Git</a:t>
-            </a:r>
-            <a:r>
-              <a:rPr lang="en-US" dirty="0">
-                <a:latin typeface="Calibri" charset="0"/>
-              </a:rPr>
-              <a:t> is open source</a:t>
-            </a:r>
-          </a:p>
-          <a:p>
-            <a:pPr>
-              <a:spcBef>
-                <a:spcPts val="800"/>
-              </a:spcBef>
-              <a:buFont typeface="Arial" charset="0"/>
-              <a:buChar char="•"/>
-              <a:defRPr/>
-            </a:pPr>
-            <a:r>
-              <a:rPr lang="en-US" dirty="0" err="1">
-                <a:latin typeface="Calibri" charset="0"/>
-              </a:rPr>
-              <a:t>Git</a:t>
-            </a:r>
-            <a:r>
-              <a:rPr lang="en-US" dirty="0">
-                <a:latin typeface="Calibri" charset="0"/>
-              </a:rPr>
-              <a:t> runs on every platform</a:t>
-            </a:r>
-          </a:p>
-          <a:p>
-            <a:pPr lvl="1">
-              <a:spcBef>
-                <a:spcPts val="800"/>
-              </a:spcBef>
-              <a:buFont typeface="Arial" charset="0"/>
-              <a:buChar char="•"/>
-              <a:defRPr/>
-            </a:pPr>
-            <a:r>
-              <a:rPr lang="en-US" sz="3200" dirty="0">
-                <a:latin typeface="Calibri" charset="0"/>
-              </a:rPr>
-              <a:t>even Plan 9 From Outer Space</a:t>
-            </a:r>
-          </a:p>
-          <a:p>
-            <a:pPr>
-              <a:spcBef>
-                <a:spcPts val="800"/>
-              </a:spcBef>
-              <a:buFont typeface="Arial" charset="0"/>
-              <a:buChar char="•"/>
-              <a:defRPr/>
-            </a:pPr>
-            <a:r>
-              <a:rPr lang="en-US" dirty="0" err="1">
-                <a:latin typeface="Calibri" charset="0"/>
-              </a:rPr>
-              <a:t>Git</a:t>
-            </a:r>
-            <a:r>
-              <a:rPr lang="en-US" dirty="0">
-                <a:latin typeface="Calibri" charset="0"/>
-              </a:rPr>
-              <a:t> is better than all previous version control tools (in my opinion, and I’ve used quite a few)</a:t>
-            </a:r>
-          </a:p>
-          <a:p>
-            <a:pPr>
-              <a:spcBef>
-                <a:spcPts val="800"/>
-              </a:spcBef>
-              <a:buFont typeface="Arial" charset="0"/>
-              <a:buChar char="•"/>
-              <a:defRPr/>
-            </a:pPr>
-            <a:endParaRPr lang="en-US" dirty="0">
-              <a:latin typeface="Calibri" charset="0"/>
-            </a:endParaRPr>
-          </a:p>
-          <a:p>
-            <a:endParaRPr lang="en-US" dirty="0"/>
-          </a:p>
-        </p:txBody>
-      </p:sp>
+      <p:pic>
+        <p:nvPicPr>
+          <p:cNvPr id="2" name="Picture 1"/>
+          <p:cNvPicPr>
+            <a:picLocks noChangeAspect="1"/>
+          </p:cNvPicPr>
+          <p:nvPr/>
+        </p:nvPicPr>
+        <p:blipFill>
+          <a:blip r:embed="rId3"/>
+          <a:stretch>
+            <a:fillRect/>
+          </a:stretch>
+        </p:blipFill>
+        <p:spPr>
+          <a:xfrm>
+            <a:off x="673100" y="1778000"/>
+            <a:ext cx="7785100" cy="3302000"/>
+          </a:xfrm>
+          <a:prstGeom prst="rect">
+            <a:avLst/>
+          </a:prstGeom>
+        </p:spPr>
+      </p:pic>
     </p:spTree>
     <p:extLst>
       <p:ext uri="{BB962C8B-B14F-4D97-AF65-F5344CB8AC3E}">
-        <p14:creationId xmlns:p14="http://schemas.microsoft.com/office/powerpoint/2010/main" val="503709198"/>
+        <p14:creationId xmlns:p14="http://schemas.microsoft.com/office/powerpoint/2010/main" val="939614745"/>
       </p:ext>
     </p:extLst>
   </p:cSld>
   <p:clrMapOvr>
     <a:masterClrMapping/>
   </p:clrMapOvr>
+  <p:transition spd="med"/>
+  <p:timing>
+    <p:tnLst>
+      <p:par>
+        <p:cTn id="1" dur="indefinite" restart="never" nodeType="tmRoot">
+          <p:childTnLst>
+            <p:seq concurrent="1" nextAc="seek">
+              <p:cTn id="2" dur="0" nodeType="mainSeq"/>
+              <p:prevCondLst>
+                <p:cond evt="onPrev" delay="0">
+                  <p:tgtEl>
+                    <p:sldTgt/>
+                  </p:tgtEl>
+                </p:cond>
+              </p:prevCondLst>
+              <p:nextCondLst>
+                <p:cond evt="onNext" delay="0">
+                  <p:tgtEl>
+                    <p:sldTgt/>
+                  </p:tgtEl>
+                </p:cond>
+              </p:nextCondLst>
+            </p:seq>
+          </p:childTnLst>
+        </p:cTn>
+      </p:par>
+    </p:tnLst>
+  </p:timing>
 </p:sld>
 </file>
 
@@ -6808,171 +6828,68 @@
           <a:chExt cx="0" cy="0"/>
         </a:xfrm>
       </p:grpSpPr>
-      <p:sp>
-        <p:nvSpPr>
-          <p:cNvPr id="2" name="Title 1"/>
-          <p:cNvSpPr>
-            <a:spLocks noGrp="1"/>
-          </p:cNvSpPr>
-          <p:nvPr>
-            <p:ph type="title"/>
-          </p:nvPr>
-        </p:nvSpPr>
-        <p:spPr/>
-        <p:txBody>
-          <a:bodyPr/>
-          <a:lstStyle/>
-          <a:p>
-            <a:r>
-              <a:rPr lang="en-US" dirty="0" smtClean="0"/>
-              <a:t>What is GitHub?</a:t>
-            </a:r>
-            <a:endParaRPr lang="en-US" dirty="0"/>
-          </a:p>
-        </p:txBody>
-      </p:sp>
-      <p:sp>
-        <p:nvSpPr>
-          <p:cNvPr id="3" name="Content Placeholder 2"/>
-          <p:cNvSpPr>
-            <a:spLocks noGrp="1"/>
-          </p:cNvSpPr>
-          <p:nvPr>
-            <p:ph idx="1"/>
-          </p:nvPr>
-        </p:nvSpPr>
-        <p:spPr/>
-        <p:txBody>
-          <a:bodyPr/>
-          <a:lstStyle/>
-          <a:p>
-            <a:pPr>
-              <a:spcBef>
-                <a:spcPts val="800"/>
-              </a:spcBef>
-              <a:buFont typeface="Arial" charset="0"/>
-              <a:buChar char="•"/>
-              <a:defRPr/>
-            </a:pPr>
-            <a:r>
-              <a:rPr lang="en-US" dirty="0">
-                <a:latin typeface="Calibri" charset="0"/>
-              </a:rPr>
-              <a:t>‘</a:t>
-            </a:r>
-            <a:r>
-              <a:rPr lang="en-US" dirty="0" err="1">
-                <a:latin typeface="Calibri" charset="0"/>
-              </a:rPr>
-              <a:t>Git</a:t>
-            </a:r>
-            <a:r>
-              <a:rPr lang="en-US" dirty="0">
-                <a:latin typeface="Calibri" charset="0"/>
-              </a:rPr>
-              <a:t> in the cloud’</a:t>
-            </a:r>
-          </a:p>
-          <a:p>
-            <a:pPr lvl="1">
-              <a:spcBef>
-                <a:spcPts val="800"/>
-              </a:spcBef>
-              <a:buFont typeface="Arial" charset="0"/>
-              <a:buChar char="•"/>
-              <a:defRPr/>
-            </a:pPr>
-            <a:r>
-              <a:rPr lang="en-US" sz="3200" dirty="0">
-                <a:latin typeface="Calibri" charset="0"/>
-              </a:rPr>
-              <a:t>Your </a:t>
-            </a:r>
-            <a:r>
-              <a:rPr lang="en-US" sz="3200" dirty="0" err="1">
-                <a:latin typeface="Calibri" charset="0"/>
-              </a:rPr>
-              <a:t>git</a:t>
-            </a:r>
-            <a:r>
-              <a:rPr lang="en-US" sz="3200" dirty="0">
-                <a:latin typeface="Calibri" charset="0"/>
-              </a:rPr>
-              <a:t> repository lives on </a:t>
-            </a:r>
-            <a:r>
-              <a:rPr lang="en-US" sz="3200" dirty="0" err="1">
-                <a:latin typeface="Calibri" charset="0"/>
-              </a:rPr>
-              <a:t>GitHub.com</a:t>
-            </a:r>
-            <a:endParaRPr lang="en-US" sz="3200" dirty="0">
-              <a:latin typeface="Calibri" charset="0"/>
-            </a:endParaRPr>
-          </a:p>
-          <a:p>
-            <a:pPr lvl="1">
-              <a:spcBef>
-                <a:spcPts val="800"/>
-              </a:spcBef>
-              <a:buFont typeface="Arial" charset="0"/>
-              <a:buChar char="•"/>
-              <a:defRPr/>
-            </a:pPr>
-            <a:r>
-              <a:rPr lang="en-US" sz="3200" dirty="0">
-                <a:latin typeface="Calibri" charset="0"/>
-              </a:rPr>
-              <a:t>Other people can download and use your code</a:t>
-            </a:r>
-          </a:p>
-          <a:p>
-            <a:pPr lvl="1">
-              <a:spcBef>
-                <a:spcPts val="800"/>
-              </a:spcBef>
-              <a:buFont typeface="Arial" charset="0"/>
-              <a:buChar char="•"/>
-              <a:defRPr/>
-            </a:pPr>
-            <a:r>
-              <a:rPr lang="en-US" sz="3200" dirty="0">
-                <a:latin typeface="Calibri" charset="0"/>
-              </a:rPr>
-              <a:t>There is an issue tracker for your code</a:t>
-            </a:r>
-          </a:p>
-          <a:p>
-            <a:pPr lvl="1">
-              <a:spcBef>
-                <a:spcPts val="800"/>
-              </a:spcBef>
-              <a:buFont typeface="Arial" charset="0"/>
-              <a:buChar char="•"/>
-              <a:defRPr/>
-            </a:pPr>
-            <a:r>
-              <a:rPr lang="en-US" sz="3200" dirty="0">
-                <a:latin typeface="Calibri" charset="0"/>
-              </a:rPr>
-              <a:t>You can develop code collaboratively using GitHub</a:t>
-            </a:r>
-          </a:p>
-          <a:p>
-            <a:endParaRPr lang="en-US" dirty="0"/>
-          </a:p>
-        </p:txBody>
-      </p:sp>
+      <p:pic>
+        <p:nvPicPr>
+          <p:cNvPr id="4" name="Picture 3"/>
+          <p:cNvPicPr>
+            <a:picLocks noChangeAspect="1"/>
+          </p:cNvPicPr>
+          <p:nvPr/>
+        </p:nvPicPr>
+        <p:blipFill>
+          <a:blip r:embed="rId3"/>
+          <a:stretch>
+            <a:fillRect/>
+          </a:stretch>
+        </p:blipFill>
+        <p:spPr>
+          <a:xfrm>
+            <a:off x="508000" y="977900"/>
+            <a:ext cx="8115300" cy="4902200"/>
+          </a:xfrm>
+          <a:prstGeom prst="rect">
+            <a:avLst/>
+          </a:prstGeom>
+        </p:spPr>
+      </p:pic>
     </p:spTree>
     <p:extLst>
       <p:ext uri="{BB962C8B-B14F-4D97-AF65-F5344CB8AC3E}">
-        <p14:creationId xmlns:p14="http://schemas.microsoft.com/office/powerpoint/2010/main" val="1819760004"/>
+        <p14:creationId xmlns:p14="http://schemas.microsoft.com/office/powerpoint/2010/main" val="566946790"/>
       </p:ext>
     </p:extLst>
   </p:cSld>
   <p:clrMapOvr>
     <a:masterClrMapping/>
   </p:clrMapOvr>
+  <p:transition spd="med"/>
+  <p:timing>
+    <p:tnLst>
+      <p:par>
+        <p:cTn id="1" dur="indefinite" restart="never" nodeType="tmRoot">
+          <p:childTnLst>
+            <p:seq concurrent="1" nextAc="seek">
+              <p:cTn id="2" dur="0" nodeType="mainSeq"/>
+              <p:prevCondLst>
+                <p:cond evt="onPrev" delay="0">
+                  <p:tgtEl>
+                    <p:sldTgt/>
+                  </p:tgtEl>
+                </p:cond>
+              </p:prevCondLst>
+              <p:nextCondLst>
+                <p:cond evt="onNext" delay="0">
+                  <p:tgtEl>
+                    <p:sldTgt/>
+                  </p:tgtEl>
+                </p:cond>
+              </p:nextCondLst>
+            </p:seq>
+          </p:childTnLst>
+        </p:cTn>
+      </p:par>
+    </p:tnLst>
+  </p:timing>
 </p:sld>
 </file>
 
@@ -7009,8 +6926,8 @@
         </p:blipFill>
         <p:spPr>
           <a:xfrm>
-            <a:off x="673100" y="1778000"/>
-            <a:ext cx="7785100" cy="3302000"/>
+            <a:off x="901700" y="952500"/>
+            <a:ext cx="7340600" cy="4940300"/>
           </a:xfrm>
           <a:prstGeom prst="rect">
             <a:avLst/>
@@ -7020,7 +6937,7 @@
     </p:spTree>
     <p:extLst>
       <p:ext uri="{BB962C8B-B14F-4D97-AF65-F5344CB8AC3E}">
-        <p14:creationId xmlns:p14="http://schemas.microsoft.com/office/powerpoint/2010/main" val="939614745"/>
+        <p14:creationId xmlns:p14="http://schemas.microsoft.com/office/powerpoint/2010/main" val="1613765588"/>
       </p:ext>
     </p:extLst>
   </p:cSld>
@@ -7091,8 +7008,8 @@
         </p:blipFill>
         <p:spPr>
           <a:xfrm>
-            <a:off x="508000" y="977900"/>
-            <a:ext cx="8115300" cy="4902200"/>
+            <a:off x="0" y="2336800"/>
+            <a:ext cx="9144000" cy="2163223"/>
           </a:xfrm>
           <a:prstGeom prst="rect">
             <a:avLst/>
@@ -7102,7 +7019,7 @@
     </p:spTree>
     <p:extLst>
       <p:ext uri="{BB962C8B-B14F-4D97-AF65-F5344CB8AC3E}">
-        <p14:creationId xmlns:p14="http://schemas.microsoft.com/office/powerpoint/2010/main" val="566946790"/>
+        <p14:creationId xmlns:p14="http://schemas.microsoft.com/office/powerpoint/2010/main" val="58145480"/>
       </p:ext>
     </p:extLst>
   </p:cSld>
@@ -7173,8 +7090,8 @@
         </p:blipFill>
         <p:spPr>
           <a:xfrm>
-            <a:off x="901700" y="952500"/>
-            <a:ext cx="7340600" cy="4940300"/>
+            <a:off x="0" y="774700"/>
+            <a:ext cx="9144000" cy="5294489"/>
           </a:xfrm>
           <a:prstGeom prst="rect">
             <a:avLst/>
@@ -7184,7 +7101,7 @@
     </p:spTree>
     <p:extLst>
       <p:ext uri="{BB962C8B-B14F-4D97-AF65-F5344CB8AC3E}">
-        <p14:creationId xmlns:p14="http://schemas.microsoft.com/office/powerpoint/2010/main" val="1613765588"/>
+        <p14:creationId xmlns:p14="http://schemas.microsoft.com/office/powerpoint/2010/main" val="1781815951"/>
       </p:ext>
     </p:extLst>
   </p:cSld>
@@ -7255,8 +7172,8 @@
         </p:blipFill>
         <p:spPr>
           <a:xfrm>
-            <a:off x="0" y="2336800"/>
-            <a:ext cx="9144000" cy="2163223"/>
+            <a:off x="0" y="800100"/>
+            <a:ext cx="9144000" cy="5235048"/>
           </a:xfrm>
           <a:prstGeom prst="rect">
             <a:avLst/>
@@ -7266,7 +7183,7 @@
     </p:spTree>
     <p:extLst>
       <p:ext uri="{BB962C8B-B14F-4D97-AF65-F5344CB8AC3E}">
-        <p14:creationId xmlns:p14="http://schemas.microsoft.com/office/powerpoint/2010/main" val="58145480"/>
+        <p14:creationId xmlns:p14="http://schemas.microsoft.com/office/powerpoint/2010/main" val="156234336"/>
       </p:ext>
     </p:extLst>
   </p:cSld>
@@ -7338,11 +7255,7 @@
           <a:p>
             <a:r>
               <a:rPr lang="en-US" dirty="0" smtClean="0"/>
-              <a:t>A note</a:t>
-            </a:r>
-            <a:r>
-              <a:rPr lang="mr-IN" dirty="0" smtClean="0"/>
-              <a:t>…</a:t>
+              <a:t>Overview</a:t>
             </a:r>
             <a:endParaRPr lang="en-US" dirty="0"/>
           </a:p>
@@ -7372,14 +7285,14 @@
               <a:defRPr/>
             </a:pPr>
             <a:r>
-              <a:rPr lang="en-US" dirty="0" smtClean="0">
+              <a:rPr lang="en-US" dirty="0">
                 <a:latin typeface="Calibri" charset="0"/>
               </a:rPr>
-              <a:t>Ecosystem integration</a:t>
-            </a:r>
-          </a:p>
-          <a:p>
-            <a:pPr lvl="1">
+              <a:t>What is version control?</a:t>
+            </a:r>
+          </a:p>
+          <a:p>
+            <a:pPr>
               <a:spcBef>
                 <a:spcPts val="800"/>
               </a:spcBef>
@@ -7388,14 +7301,14 @@
               <a:defRPr/>
             </a:pPr>
             <a:r>
-              <a:rPr lang="en-US" dirty="0" smtClean="0">
+              <a:rPr lang="en-US" dirty="0">
                 <a:latin typeface="Calibri" charset="0"/>
               </a:rPr>
-              <a:t>What is the relationship between</a:t>
-            </a:r>
-          </a:p>
-          <a:p>
-            <a:pPr lvl="2">
+              <a:t>Why do I need version control?</a:t>
+            </a:r>
+          </a:p>
+          <a:p>
+            <a:pPr>
               <a:spcBef>
                 <a:spcPts val="800"/>
               </a:spcBef>
@@ -7404,14 +7317,26 @@
               <a:defRPr/>
             </a:pPr>
             <a:r>
-              <a:rPr lang="en-US" dirty="0" smtClean="0">
+              <a:rPr lang="en-US" dirty="0">
                 <a:latin typeface="Calibri" charset="0"/>
               </a:rPr>
-              <a:t>The command line</a:t>
-            </a:r>
-          </a:p>
-          <a:p>
-            <a:pPr lvl="2">
+              <a:t>What are </a:t>
+            </a:r>
+            <a:r>
+              <a:rPr lang="en-US" dirty="0" err="1">
+                <a:latin typeface="Calibri" charset="0"/>
+              </a:rPr>
+              <a:t>git</a:t>
+            </a:r>
+            <a:r>
+              <a:rPr lang="en-US" dirty="0">
+                <a:latin typeface="Calibri" charset="0"/>
+              </a:rPr>
+              <a:t> and GitHub?</a:t>
+            </a:r>
+          </a:p>
+          <a:p>
+            <a:pPr>
               <a:spcBef>
                 <a:spcPts val="800"/>
               </a:spcBef>
@@ -7420,65 +7345,13 @@
               <a:defRPr/>
             </a:pPr>
             <a:r>
-              <a:rPr lang="en-US" dirty="0" smtClean="0">
+              <a:rPr lang="en-US" dirty="0">
                 <a:latin typeface="Calibri" charset="0"/>
               </a:rPr>
-              <a:t>Python</a:t>
-            </a:r>
-          </a:p>
-          <a:p>
-            <a:pPr lvl="2">
-              <a:spcBef>
-                <a:spcPts val="800"/>
-              </a:spcBef>
-              <a:buFont typeface="Arial" charset="0"/>
-              <a:buChar char="•"/>
-              <a:defRPr/>
-            </a:pPr>
-            <a:r>
-              <a:rPr lang="en-US" dirty="0" err="1" smtClean="0">
-                <a:latin typeface="Calibri" charset="0"/>
-              </a:rPr>
-              <a:t>Jupyter</a:t>
-            </a:r>
-            <a:r>
-              <a:rPr lang="en-US" dirty="0" smtClean="0">
-                <a:latin typeface="Calibri" charset="0"/>
-              </a:rPr>
-              <a:t> notebooks</a:t>
-            </a:r>
-          </a:p>
-          <a:p>
-            <a:pPr lvl="2">
-              <a:spcBef>
-                <a:spcPts val="800"/>
-              </a:spcBef>
-              <a:buFont typeface="Arial" charset="0"/>
-              <a:buChar char="•"/>
-              <a:defRPr/>
-            </a:pPr>
-            <a:r>
-              <a:rPr lang="en-US" dirty="0" smtClean="0">
-                <a:latin typeface="Calibri" charset="0"/>
-              </a:rPr>
-              <a:t>Version control</a:t>
-            </a:r>
-          </a:p>
-          <a:p>
-            <a:pPr lvl="1">
-              <a:spcBef>
-                <a:spcPts val="800"/>
-              </a:spcBef>
-              <a:buFont typeface="Arial" charset="0"/>
-              <a:buChar char="•"/>
-              <a:defRPr/>
-            </a:pPr>
-            <a:r>
-              <a:rPr lang="en-US" dirty="0" smtClean="0">
-                <a:latin typeface="Calibri" charset="0"/>
-              </a:rPr>
-              <a:t>Why aren’t we using an Integrated Development Environment (IDE) for our Python work?</a:t>
-            </a:r>
+              <a:t>Hands-on guided tour</a:t>
+            </a:r>
+          </a:p>
+          <a:p>
             <a:endParaRPr lang="en-US" dirty="0"/>
           </a:p>
         </p:txBody>
@@ -7486,7 +7359,7 @@
     </p:spTree>
     <p:extLst>
       <p:ext uri="{BB962C8B-B14F-4D97-AF65-F5344CB8AC3E}">
-        <p14:creationId xmlns:p14="http://schemas.microsoft.com/office/powerpoint/2010/main" val="18744140"/>
+        <p14:creationId xmlns:p14="http://schemas.microsoft.com/office/powerpoint/2010/main" val="994220001"/>
       </p:ext>
     </p:extLst>
   </p:cSld>
@@ -7529,8 +7402,8 @@
         </p:blipFill>
         <p:spPr>
           <a:xfrm>
-            <a:off x="0" y="774700"/>
-            <a:ext cx="9144000" cy="5294489"/>
+            <a:off x="444500" y="12700"/>
+            <a:ext cx="8255000" cy="6819900"/>
           </a:xfrm>
           <a:prstGeom prst="rect">
             <a:avLst/>
@@ -7540,7 +7413,7 @@
     </p:spTree>
     <p:extLst>
       <p:ext uri="{BB962C8B-B14F-4D97-AF65-F5344CB8AC3E}">
-        <p14:creationId xmlns:p14="http://schemas.microsoft.com/office/powerpoint/2010/main" val="1781815951"/>
+        <p14:creationId xmlns:p14="http://schemas.microsoft.com/office/powerpoint/2010/main" val="2124841118"/>
       </p:ext>
     </p:extLst>
   </p:cSld>
@@ -7597,7 +7470,7 @@
       </p:grpSpPr>
       <p:pic>
         <p:nvPicPr>
-          <p:cNvPr id="4" name="Picture 3"/>
+          <p:cNvPr id="5" name="Picture 4"/>
           <p:cNvPicPr>
             <a:picLocks noChangeAspect="1"/>
           </p:cNvPicPr>
@@ -7611,8 +7484,8 @@
         </p:blipFill>
         <p:spPr>
           <a:xfrm>
-            <a:off x="0" y="800100"/>
-            <a:ext cx="9144000" cy="5235048"/>
+            <a:off x="3238500" y="2286000"/>
+            <a:ext cx="2654300" cy="2286000"/>
           </a:xfrm>
           <a:prstGeom prst="rect">
             <a:avLst/>
@@ -7622,7 +7495,7 @@
     </p:spTree>
     <p:extLst>
       <p:ext uri="{BB962C8B-B14F-4D97-AF65-F5344CB8AC3E}">
-        <p14:creationId xmlns:p14="http://schemas.microsoft.com/office/powerpoint/2010/main" val="156234336"/>
+        <p14:creationId xmlns:p14="http://schemas.microsoft.com/office/powerpoint/2010/main" val="1755294082"/>
       </p:ext>
     </p:extLst>
   </p:cSld>
@@ -7693,8 +7566,8 @@
         </p:blipFill>
         <p:spPr>
           <a:xfrm>
-            <a:off x="444500" y="12700"/>
-            <a:ext cx="8255000" cy="6819900"/>
+            <a:off x="0" y="393700"/>
+            <a:ext cx="9144000" cy="6046470"/>
           </a:xfrm>
           <a:prstGeom prst="rect">
             <a:avLst/>
@@ -7704,7 +7577,7 @@
     </p:spTree>
     <p:extLst>
       <p:ext uri="{BB962C8B-B14F-4D97-AF65-F5344CB8AC3E}">
-        <p14:creationId xmlns:p14="http://schemas.microsoft.com/office/powerpoint/2010/main" val="2124841118"/>
+        <p14:creationId xmlns:p14="http://schemas.microsoft.com/office/powerpoint/2010/main" val="186980271"/>
       </p:ext>
     </p:extLst>
   </p:cSld>
@@ -7761,7 +7634,7 @@
       </p:grpSpPr>
       <p:pic>
         <p:nvPicPr>
-          <p:cNvPr id="5" name="Picture 4"/>
+          <p:cNvPr id="4" name="Picture 3"/>
           <p:cNvPicPr>
             <a:picLocks noChangeAspect="1"/>
           </p:cNvPicPr>
@@ -7775,8 +7648,8 @@
         </p:blipFill>
         <p:spPr>
           <a:xfrm>
-            <a:off x="3238500" y="2286000"/>
-            <a:ext cx="2654300" cy="2286000"/>
+            <a:off x="0" y="1968500"/>
+            <a:ext cx="9144000" cy="2904024"/>
           </a:xfrm>
           <a:prstGeom prst="rect">
             <a:avLst/>
@@ -7786,7 +7659,7 @@
     </p:spTree>
     <p:extLst>
       <p:ext uri="{BB962C8B-B14F-4D97-AF65-F5344CB8AC3E}">
-        <p14:creationId xmlns:p14="http://schemas.microsoft.com/office/powerpoint/2010/main" val="1755294082"/>
+        <p14:creationId xmlns:p14="http://schemas.microsoft.com/office/powerpoint/2010/main" val="587873242"/>
       </p:ext>
     </p:extLst>
   </p:cSld>
@@ -7857,8 +7730,8 @@
         </p:blipFill>
         <p:spPr>
           <a:xfrm>
-            <a:off x="0" y="393700"/>
-            <a:ext cx="9144000" cy="6046470"/>
+            <a:off x="1104900" y="0"/>
+            <a:ext cx="6910485" cy="6858000"/>
           </a:xfrm>
           <a:prstGeom prst="rect">
             <a:avLst/>
@@ -7868,7 +7741,7 @@
     </p:spTree>
     <p:extLst>
       <p:ext uri="{BB962C8B-B14F-4D97-AF65-F5344CB8AC3E}">
-        <p14:creationId xmlns:p14="http://schemas.microsoft.com/office/powerpoint/2010/main" val="186980271"/>
+        <p14:creationId xmlns:p14="http://schemas.microsoft.com/office/powerpoint/2010/main" val="2064230643"/>
       </p:ext>
     </p:extLst>
   </p:cSld>
@@ -7939,8 +7812,8 @@
         </p:blipFill>
         <p:spPr>
           <a:xfrm>
-            <a:off x="0" y="1968500"/>
-            <a:ext cx="9144000" cy="2904024"/>
+            <a:off x="622300" y="0"/>
+            <a:ext cx="7879136" cy="6858000"/>
           </a:xfrm>
           <a:prstGeom prst="rect">
             <a:avLst/>
@@ -7950,7 +7823,7 @@
     </p:spTree>
     <p:extLst>
       <p:ext uri="{BB962C8B-B14F-4D97-AF65-F5344CB8AC3E}">
-        <p14:creationId xmlns:p14="http://schemas.microsoft.com/office/powerpoint/2010/main" val="587873242"/>
+        <p14:creationId xmlns:p14="http://schemas.microsoft.com/office/powerpoint/2010/main" val="2142256303"/>
       </p:ext>
     </p:extLst>
   </p:cSld>
@@ -8014,170 +7887,6 @@
           <p:nvPr/>
         </p:nvPicPr>
         <p:blipFill>
-          <a:blip r:embed="rId3"/>
-          <a:stretch>
-            <a:fillRect/>
-          </a:stretch>
-        </p:blipFill>
-        <p:spPr>
-          <a:xfrm>
-            <a:off x="1104900" y="0"/>
-            <a:ext cx="6910485" cy="6858000"/>
-          </a:xfrm>
-          <a:prstGeom prst="rect">
-            <a:avLst/>
-          </a:prstGeom>
-        </p:spPr>
-      </p:pic>
-    </p:spTree>
-    <p:extLst>
-      <p:ext uri="{BB962C8B-B14F-4D97-AF65-F5344CB8AC3E}">
-        <p14:creationId xmlns:p14="http://schemas.microsoft.com/office/powerpoint/2010/main" val="2064230643"/>
-      </p:ext>
-    </p:extLst>
-  </p:cSld>
-  <p:clrMapOvr>
-    <a:masterClrMapping/>
-  </p:clrMapOvr>
-  <p:transition spd="med"/>
-  <p:timing>
-    <p:tnLst>
-      <p:par>
-        <p:cTn id="1" dur="indefinite" restart="never" nodeType="tmRoot">
-          <p:childTnLst>
-            <p:seq concurrent="1" nextAc="seek">
-              <p:cTn id="2" dur="0" nodeType="mainSeq"/>
-              <p:prevCondLst>
-                <p:cond evt="onPrev" delay="0">
-                  <p:tgtEl>
-                    <p:sldTgt/>
-                  </p:tgtEl>
-                </p:cond>
-              </p:prevCondLst>
-              <p:nextCondLst>
-                <p:cond evt="onNext" delay="0">
-                  <p:tgtEl>
-                    <p:sldTgt/>
-                  </p:tgtEl>
-                </p:cond>
-              </p:nextCondLst>
-            </p:seq>
-          </p:childTnLst>
-        </p:cTn>
-      </p:par>
-    </p:tnLst>
-  </p:timing>
-</p:sld>
-</file>
-
-<file path=ppt/slides/slide27.xml><?xml version="1.0" encoding="utf-8"?>
-<p:sld xmlns:a="http://schemas.openxmlformats.org/drawingml/2006/main" xmlns:r="http://schemas.openxmlformats.org/officeDocument/2006/relationships" xmlns:p="http://schemas.openxmlformats.org/presentationml/2006/main">
-  <p:cSld>
-    <p:spTree>
-      <p:nvGrpSpPr>
-        <p:cNvPr id="1" name=""/>
-        <p:cNvGrpSpPr/>
-        <p:nvPr/>
-      </p:nvGrpSpPr>
-      <p:grpSpPr>
-        <a:xfrm>
-          <a:off x="0" y="0"/>
-          <a:ext cx="0" cy="0"/>
-          <a:chOff x="0" y="0"/>
-          <a:chExt cx="0" cy="0"/>
-        </a:xfrm>
-      </p:grpSpPr>
-      <p:pic>
-        <p:nvPicPr>
-          <p:cNvPr id="4" name="Picture 3"/>
-          <p:cNvPicPr>
-            <a:picLocks noChangeAspect="1"/>
-          </p:cNvPicPr>
-          <p:nvPr/>
-        </p:nvPicPr>
-        <p:blipFill>
-          <a:blip r:embed="rId3"/>
-          <a:stretch>
-            <a:fillRect/>
-          </a:stretch>
-        </p:blipFill>
-        <p:spPr>
-          <a:xfrm>
-            <a:off x="622300" y="0"/>
-            <a:ext cx="7879136" cy="6858000"/>
-          </a:xfrm>
-          <a:prstGeom prst="rect">
-            <a:avLst/>
-          </a:prstGeom>
-        </p:spPr>
-      </p:pic>
-    </p:spTree>
-    <p:extLst>
-      <p:ext uri="{BB962C8B-B14F-4D97-AF65-F5344CB8AC3E}">
-        <p14:creationId xmlns:p14="http://schemas.microsoft.com/office/powerpoint/2010/main" val="2142256303"/>
-      </p:ext>
-    </p:extLst>
-  </p:cSld>
-  <p:clrMapOvr>
-    <a:masterClrMapping/>
-  </p:clrMapOvr>
-  <p:transition spd="med"/>
-  <p:timing>
-    <p:tnLst>
-      <p:par>
-        <p:cTn id="1" dur="indefinite" restart="never" nodeType="tmRoot">
-          <p:childTnLst>
-            <p:seq concurrent="1" nextAc="seek">
-              <p:cTn id="2" dur="0" nodeType="mainSeq"/>
-              <p:prevCondLst>
-                <p:cond evt="onPrev" delay="0">
-                  <p:tgtEl>
-                    <p:sldTgt/>
-                  </p:tgtEl>
-                </p:cond>
-              </p:prevCondLst>
-              <p:nextCondLst>
-                <p:cond evt="onNext" delay="0">
-                  <p:tgtEl>
-                    <p:sldTgt/>
-                  </p:tgtEl>
-                </p:cond>
-              </p:nextCondLst>
-            </p:seq>
-          </p:childTnLst>
-        </p:cTn>
-      </p:par>
-    </p:tnLst>
-  </p:timing>
-</p:sld>
-</file>
-
-<file path=ppt/slides/slide28.xml><?xml version="1.0" encoding="utf-8"?>
-<p:sld xmlns:a="http://schemas.openxmlformats.org/drawingml/2006/main" xmlns:r="http://schemas.openxmlformats.org/officeDocument/2006/relationships" xmlns:p="http://schemas.openxmlformats.org/presentationml/2006/main">
-  <p:cSld>
-    <p:spTree>
-      <p:nvGrpSpPr>
-        <p:cNvPr id="1" name=""/>
-        <p:cNvGrpSpPr/>
-        <p:nvPr/>
-      </p:nvGrpSpPr>
-      <p:grpSpPr>
-        <a:xfrm>
-          <a:off x="0" y="0"/>
-          <a:ext cx="0" cy="0"/>
-          <a:chOff x="0" y="0"/>
-          <a:chExt cx="0" cy="0"/>
-        </a:xfrm>
-      </p:grpSpPr>
-      <p:pic>
-        <p:nvPicPr>
-          <p:cNvPr id="2" name="Picture 1"/>
-          <p:cNvPicPr>
-            <a:picLocks noChangeAspect="1"/>
-          </p:cNvPicPr>
-          <p:nvPr/>
-        </p:nvPicPr>
-        <p:blipFill>
           <a:blip r:embed="rId2"/>
           <a:stretch>
             <a:fillRect/>
@@ -8240,7 +7949,7 @@
           <a:p>
             <a:r>
               <a:rPr lang="en-US" dirty="0" smtClean="0"/>
-              <a:t>Markdown</a:t>
+              <a:t>What is version control?</a:t>
             </a:r>
             <a:endParaRPr lang="en-US" dirty="0"/>
           </a:p>
@@ -8270,10 +7979,16 @@
               <a:defRPr/>
             </a:pPr>
             <a:r>
-              <a:rPr lang="en-US" dirty="0" smtClean="0">
+              <a:rPr lang="en-US" dirty="0">
                 <a:latin typeface="Calibri" charset="0"/>
               </a:rPr>
-              <a:t>Let us all go to</a:t>
+              <a:t>Writing a manuscript</a:t>
+            </a:r>
+            <a:r>
+              <a:rPr lang="is-IS" dirty="0">
+                <a:latin typeface="Calibri" charset="0"/>
+              </a:rPr>
+              <a:t>…</a:t>
             </a:r>
           </a:p>
           <a:p>
@@ -8286,24 +8001,11 @@
               <a:defRPr/>
             </a:pPr>
             <a:r>
-              <a:rPr lang="en-US" dirty="0">
-                <a:hlinkClick r:id="rId2"/>
+              <a:rPr lang="is-IS" sz="3200" dirty="0">
+                <a:latin typeface="Calibri" charset="0"/>
               </a:rPr>
-              <a:t>https://</a:t>
-            </a:r>
-            <a:r>
-              <a:rPr lang="en-US" dirty="0" smtClean="0">
-                <a:hlinkClick r:id="rId2"/>
-              </a:rPr>
-              <a:t>jbt.github.io</a:t>
-            </a:r>
-            <a:r>
-              <a:rPr lang="en-US" smtClean="0">
-                <a:hlinkClick r:id="rId2"/>
-              </a:rPr>
-              <a:t>/markdown-editor</a:t>
-            </a:r>
-            <a:endParaRPr lang="en-US" smtClean="0"/>
+              <a:t>Use undo to revert to a previous state</a:t>
+            </a:r>
           </a:p>
           <a:p>
             <a:pPr lvl="1">
@@ -8314,14 +8016,19 @@
               <a:buChar char="•"/>
               <a:defRPr/>
             </a:pPr>
-            <a:endParaRPr lang="en-US" dirty="0"/>
+            <a:r>
+              <a:rPr lang="is-IS" sz="3200" dirty="0">
+                <a:latin typeface="Calibri" charset="0"/>
+              </a:rPr>
+              <a:t>Use track changes when sharing doc with your advisor</a:t>
+            </a:r>
           </a:p>
         </p:txBody>
       </p:sp>
     </p:spTree>
     <p:extLst>
       <p:ext uri="{BB962C8B-B14F-4D97-AF65-F5344CB8AC3E}">
-        <p14:creationId xmlns:p14="http://schemas.microsoft.com/office/powerpoint/2010/main" val="1674195380"/>
+        <p14:creationId xmlns:p14="http://schemas.microsoft.com/office/powerpoint/2010/main" val="1500148518"/>
       </p:ext>
     </p:extLst>
   </p:cSld>
@@ -8365,7 +8072,7 @@
           <a:p>
             <a:r>
               <a:rPr lang="en-US" dirty="0" smtClean="0"/>
-              <a:t>Overview</a:t>
+              <a:t>What is version control</a:t>
             </a:r>
             <a:endParaRPr lang="en-US" dirty="0"/>
           </a:p>
@@ -8395,14 +8102,14 @@
               <a:defRPr/>
             </a:pPr>
             <a:r>
-              <a:rPr lang="en-US" dirty="0">
+              <a:rPr lang="is-IS" dirty="0">
                 <a:latin typeface="Calibri" charset="0"/>
               </a:rPr>
-              <a:t>What is version control?</a:t>
-            </a:r>
-          </a:p>
-          <a:p>
-            <a:pPr>
+              <a:t>Version control is like a combination of undo and track changes for your code</a:t>
+            </a:r>
+          </a:p>
+          <a:p>
+            <a:pPr lvl="1">
               <a:spcBef>
                 <a:spcPts val="800"/>
               </a:spcBef>
@@ -8411,14 +8118,14 @@
               <a:defRPr/>
             </a:pPr>
             <a:r>
-              <a:rPr lang="en-US" dirty="0">
+              <a:rPr lang="is-IS" sz="3200" dirty="0">
                 <a:latin typeface="Calibri" charset="0"/>
               </a:rPr>
-              <a:t>Why do I need version control?</a:t>
-            </a:r>
-          </a:p>
-          <a:p>
-            <a:pPr>
+              <a:t>You can revert to previous versions of code</a:t>
+            </a:r>
+          </a:p>
+          <a:p>
+            <a:pPr lvl="1">
               <a:spcBef>
                 <a:spcPts val="800"/>
               </a:spcBef>
@@ -8427,26 +8134,14 @@
               <a:defRPr/>
             </a:pPr>
             <a:r>
-              <a:rPr lang="en-US" dirty="0">
+              <a:rPr lang="is-IS" sz="3200" dirty="0">
                 <a:latin typeface="Calibri" charset="0"/>
               </a:rPr>
-              <a:t>What are </a:t>
-            </a:r>
-            <a:r>
-              <a:rPr lang="en-US" dirty="0" err="1">
-                <a:latin typeface="Calibri" charset="0"/>
-              </a:rPr>
-              <a:t>git</a:t>
-            </a:r>
-            <a:r>
-              <a:rPr lang="en-US" dirty="0">
-                <a:latin typeface="Calibri" charset="0"/>
-              </a:rPr>
-              <a:t> and GitHub?</a:t>
-            </a:r>
-          </a:p>
-          <a:p>
-            <a:pPr>
+              <a:t>You can easily identify who contributed what</a:t>
+            </a:r>
+          </a:p>
+          <a:p>
+            <a:pPr lvl="1">
               <a:spcBef>
                 <a:spcPts val="800"/>
               </a:spcBef>
@@ -8454,12 +8149,28 @@
               <a:buChar char="•"/>
               <a:defRPr/>
             </a:pPr>
-            <a:r>
-              <a:rPr lang="en-US" dirty="0">
+            <a:endParaRPr lang="is-IS" sz="3200" dirty="0">
+              <a:latin typeface="Calibri" charset="0"/>
+            </a:endParaRPr>
+          </a:p>
+          <a:p>
+            <a:pPr lvl="1">
+              <a:spcBef>
+                <a:spcPts val="800"/>
+              </a:spcBef>
+              <a:buFont typeface="Arial" charset="0"/>
+              <a:buChar char="•"/>
+              <a:defRPr/>
+            </a:pPr>
+            <a:r>
+              <a:rPr lang="is-IS" sz="3200" dirty="0">
                 <a:latin typeface="Calibri" charset="0"/>
               </a:rPr>
-              <a:t>Hands-on guided tour</a:t>
-            </a:r>
+              <a:t>Version control is about tracking versions of code and developing software with people</a:t>
+            </a:r>
+            <a:endParaRPr lang="en-US" sz="3200" dirty="0">
+              <a:latin typeface="Calibri" charset="0"/>
+            </a:endParaRPr>
           </a:p>
           <a:p>
             <a:endParaRPr lang="en-US" dirty="0"/>
@@ -8469,7 +8180,7 @@
     </p:spTree>
     <p:extLst>
       <p:ext uri="{BB962C8B-B14F-4D97-AF65-F5344CB8AC3E}">
-        <p14:creationId xmlns:p14="http://schemas.microsoft.com/office/powerpoint/2010/main" val="994220001"/>
+        <p14:creationId xmlns:p14="http://schemas.microsoft.com/office/powerpoint/2010/main" val="1380445033"/>
       </p:ext>
     </p:extLst>
   </p:cSld>
@@ -8519,80 +8230,36 @@
           </a:p>
         </p:txBody>
       </p:sp>
-      <p:sp>
-        <p:nvSpPr>
-          <p:cNvPr id="3" name="Content Placeholder 2"/>
-          <p:cNvSpPr>
-            <a:spLocks noGrp="1"/>
-          </p:cNvSpPr>
+      <p:pic>
+        <p:nvPicPr>
+          <p:cNvPr id="4" name="Content Placeholder 3"/>
+          <p:cNvPicPr>
+            <a:picLocks noGrp="1" noChangeAspect="1"/>
+          </p:cNvPicPr>
           <p:nvPr>
             <p:ph idx="1"/>
           </p:nvPr>
-        </p:nvSpPr>
-        <p:spPr/>
-        <p:txBody>
-          <a:bodyPr/>
-          <a:lstStyle/>
-          <a:p>
-            <a:pPr>
-              <a:spcBef>
-                <a:spcPts val="800"/>
-              </a:spcBef>
-              <a:buFont typeface="Arial" charset="0"/>
-              <a:buChar char="•"/>
-              <a:defRPr/>
-            </a:pPr>
-            <a:r>
-              <a:rPr lang="en-US" dirty="0">
-                <a:latin typeface="Calibri" charset="0"/>
-              </a:rPr>
-              <a:t>Writing a manuscript</a:t>
-            </a:r>
-            <a:r>
-              <a:rPr lang="is-IS" dirty="0">
-                <a:latin typeface="Calibri" charset="0"/>
-              </a:rPr>
-              <a:t>…</a:t>
-            </a:r>
-          </a:p>
-          <a:p>
-            <a:pPr lvl="1">
-              <a:spcBef>
-                <a:spcPts val="800"/>
-              </a:spcBef>
-              <a:buFont typeface="Arial" charset="0"/>
-              <a:buChar char="•"/>
-              <a:defRPr/>
-            </a:pPr>
-            <a:r>
-              <a:rPr lang="is-IS" sz="3200" dirty="0">
-                <a:latin typeface="Calibri" charset="0"/>
-              </a:rPr>
-              <a:t>Use undo to revert to a previous state</a:t>
-            </a:r>
-          </a:p>
-          <a:p>
-            <a:pPr lvl="1">
-              <a:spcBef>
-                <a:spcPts val="800"/>
-              </a:spcBef>
-              <a:buFont typeface="Arial" charset="0"/>
-              <a:buChar char="•"/>
-              <a:defRPr/>
-            </a:pPr>
-            <a:r>
-              <a:rPr lang="is-IS" sz="3200" dirty="0">
-                <a:latin typeface="Calibri" charset="0"/>
-              </a:rPr>
-              <a:t>Use track changes when sharing doc with your advisor</a:t>
-            </a:r>
-          </a:p>
-        </p:txBody>
-      </p:sp>
+        </p:nvPicPr>
+        <p:blipFill>
+          <a:blip r:embed="rId2"/>
+          <a:stretch>
+            <a:fillRect/>
+          </a:stretch>
+        </p:blipFill>
+        <p:spPr>
+          <a:xfrm>
+            <a:off x="895350" y="2820987"/>
+            <a:ext cx="7353300" cy="2616200"/>
+          </a:xfrm>
+          <a:prstGeom prst="rect">
+            <a:avLst/>
+          </a:prstGeom>
+        </p:spPr>
+      </p:pic>
     </p:spTree>
     <p:extLst>
       <p:ext uri="{BB962C8B-B14F-4D97-AF65-F5344CB8AC3E}">
-        <p14:creationId xmlns:p14="http://schemas.microsoft.com/office/powerpoint/2010/main" val="1500148518"/>
+        <p14:creationId xmlns:p14="http://schemas.microsoft.com/office/powerpoint/2010/main" val="1249623642"/>
       </p:ext>
     </p:extLst>
   </p:cSld>
@@ -8634,11 +8301,7 @@
           <a:bodyPr/>
           <a:lstStyle/>
           <a:p>
-            <a:r>
-              <a:rPr lang="en-US" dirty="0" smtClean="0"/>
-              <a:t>What is version control</a:t>
-            </a:r>
-            <a:endParaRPr lang="en-US" dirty="0"/>
+            <a:endParaRPr lang="en-US"/>
           </a:p>
         </p:txBody>
       </p:sp>
@@ -8657,94 +8320,38 @@
           <a:bodyPr/>
           <a:lstStyle/>
           <a:p>
-            <a:pPr>
-              <a:spcBef>
-                <a:spcPts val="800"/>
-              </a:spcBef>
-              <a:buFont typeface="Arial" charset="0"/>
-              <a:buChar char="•"/>
-              <a:defRPr/>
-            </a:pPr>
-            <a:r>
-              <a:rPr lang="is-IS" dirty="0">
-                <a:latin typeface="Calibri" charset="0"/>
-              </a:rPr>
-              <a:t>Version control is like a combination of undo and track changes for your code</a:t>
-            </a:r>
-          </a:p>
-          <a:p>
-            <a:pPr lvl="1">
-              <a:spcBef>
-                <a:spcPts val="800"/>
-              </a:spcBef>
-              <a:buFont typeface="Arial" charset="0"/>
-              <a:buChar char="•"/>
-              <a:defRPr/>
-            </a:pPr>
-            <a:r>
-              <a:rPr lang="is-IS" sz="3200" dirty="0">
-                <a:latin typeface="Calibri" charset="0"/>
-              </a:rPr>
-              <a:t>You can revert to previous versions of code</a:t>
-            </a:r>
-          </a:p>
-          <a:p>
-            <a:pPr lvl="1">
-              <a:spcBef>
-                <a:spcPts val="800"/>
-              </a:spcBef>
-              <a:buFont typeface="Arial" charset="0"/>
-              <a:buChar char="•"/>
-              <a:defRPr/>
-            </a:pPr>
-            <a:r>
-              <a:rPr lang="is-IS" sz="3200" dirty="0">
-                <a:latin typeface="Calibri" charset="0"/>
-              </a:rPr>
-              <a:t>You can easily identify who contributed what</a:t>
-            </a:r>
-          </a:p>
-          <a:p>
-            <a:pPr lvl="1">
-              <a:spcBef>
-                <a:spcPts val="800"/>
-              </a:spcBef>
-              <a:buFont typeface="Arial" charset="0"/>
-              <a:buChar char="•"/>
-              <a:defRPr/>
-            </a:pPr>
-            <a:endParaRPr lang="is-IS" sz="3200" dirty="0">
-              <a:latin typeface="Calibri" charset="0"/>
-            </a:endParaRPr>
-          </a:p>
-          <a:p>
-            <a:pPr lvl="1">
-              <a:spcBef>
-                <a:spcPts val="800"/>
-              </a:spcBef>
-              <a:buFont typeface="Arial" charset="0"/>
-              <a:buChar char="•"/>
-              <a:defRPr/>
-            </a:pPr>
-            <a:r>
-              <a:rPr lang="is-IS" sz="3200" dirty="0">
-                <a:latin typeface="Calibri" charset="0"/>
-              </a:rPr>
-              <a:t>Version control is about tracking versions of code and developing software with people</a:t>
-            </a:r>
-            <a:endParaRPr lang="en-US" sz="3200" dirty="0">
-              <a:latin typeface="Calibri" charset="0"/>
-            </a:endParaRPr>
-          </a:p>
-          <a:p>
-            <a:endParaRPr lang="en-US" dirty="0"/>
-          </a:p>
-        </p:txBody>
-      </p:sp>
+            <a:endParaRPr lang="en-US"/>
+          </a:p>
+        </p:txBody>
+      </p:sp>
+      <p:pic>
+        <p:nvPicPr>
+          <p:cNvPr id="4" name="Picture 3"/>
+          <p:cNvPicPr>
+            <a:picLocks noChangeAspect="1"/>
+          </p:cNvPicPr>
+          <p:nvPr/>
+        </p:nvPicPr>
+        <p:blipFill>
+          <a:blip r:embed="rId2"/>
+          <a:stretch>
+            <a:fillRect/>
+          </a:stretch>
+        </p:blipFill>
+        <p:spPr>
+          <a:xfrm>
+            <a:off x="2000250" y="0"/>
+            <a:ext cx="5143500" cy="6858000"/>
+          </a:xfrm>
+          <a:prstGeom prst="rect">
+            <a:avLst/>
+          </a:prstGeom>
+        </p:spPr>
+      </p:pic>
     </p:spTree>
     <p:extLst>
       <p:ext uri="{BB962C8B-B14F-4D97-AF65-F5344CB8AC3E}">
-        <p14:creationId xmlns:p14="http://schemas.microsoft.com/office/powerpoint/2010/main" val="1380445033"/>
+        <p14:creationId xmlns:p14="http://schemas.microsoft.com/office/powerpoint/2010/main" val="1415314910"/>
       </p:ext>
     </p:extLst>
   </p:cSld>
@@ -8788,177 +8395,6 @@
           <a:p>
             <a:r>
               <a:rPr lang="en-US" dirty="0" smtClean="0"/>
-              <a:t>What is version control?</a:t>
-            </a:r>
-            <a:endParaRPr lang="en-US" dirty="0"/>
-          </a:p>
-        </p:txBody>
-      </p:sp>
-      <p:pic>
-        <p:nvPicPr>
-          <p:cNvPr id="4" name="Content Placeholder 3"/>
-          <p:cNvPicPr>
-            <a:picLocks noGrp="1" noChangeAspect="1"/>
-          </p:cNvPicPr>
-          <p:nvPr>
-            <p:ph idx="1"/>
-          </p:nvPr>
-        </p:nvPicPr>
-        <p:blipFill>
-          <a:blip r:embed="rId2"/>
-          <a:stretch>
-            <a:fillRect/>
-          </a:stretch>
-        </p:blipFill>
-        <p:spPr>
-          <a:xfrm>
-            <a:off x="895350" y="2820987"/>
-            <a:ext cx="7353300" cy="2616200"/>
-          </a:xfrm>
-          <a:prstGeom prst="rect">
-            <a:avLst/>
-          </a:prstGeom>
-        </p:spPr>
-      </p:pic>
-    </p:spTree>
-    <p:extLst>
-      <p:ext uri="{BB962C8B-B14F-4D97-AF65-F5344CB8AC3E}">
-        <p14:creationId xmlns:p14="http://schemas.microsoft.com/office/powerpoint/2010/main" val="1249623642"/>
-      </p:ext>
-    </p:extLst>
-  </p:cSld>
-  <p:clrMapOvr>
-    <a:masterClrMapping/>
-  </p:clrMapOvr>
-</p:sld>
-</file>
-
-<file path=ppt/slides/slide8.xml><?xml version="1.0" encoding="utf-8"?>
-<p:sld xmlns:a="http://schemas.openxmlformats.org/drawingml/2006/main" xmlns:r="http://schemas.openxmlformats.org/officeDocument/2006/relationships" xmlns:p="http://schemas.openxmlformats.org/presentationml/2006/main">
-  <p:cSld>
-    <p:spTree>
-      <p:nvGrpSpPr>
-        <p:cNvPr id="1" name=""/>
-        <p:cNvGrpSpPr/>
-        <p:nvPr/>
-      </p:nvGrpSpPr>
-      <p:grpSpPr>
-        <a:xfrm>
-          <a:off x="0" y="0"/>
-          <a:ext cx="0" cy="0"/>
-          <a:chOff x="0" y="0"/>
-          <a:chExt cx="0" cy="0"/>
-        </a:xfrm>
-      </p:grpSpPr>
-      <p:sp>
-        <p:nvSpPr>
-          <p:cNvPr id="2" name="Title 1"/>
-          <p:cNvSpPr>
-            <a:spLocks noGrp="1"/>
-          </p:cNvSpPr>
-          <p:nvPr>
-            <p:ph type="title"/>
-          </p:nvPr>
-        </p:nvSpPr>
-        <p:spPr/>
-        <p:txBody>
-          <a:bodyPr/>
-          <a:lstStyle/>
-          <a:p>
-            <a:endParaRPr lang="en-US"/>
-          </a:p>
-        </p:txBody>
-      </p:sp>
-      <p:sp>
-        <p:nvSpPr>
-          <p:cNvPr id="3" name="Content Placeholder 2"/>
-          <p:cNvSpPr>
-            <a:spLocks noGrp="1"/>
-          </p:cNvSpPr>
-          <p:nvPr>
-            <p:ph idx="1"/>
-          </p:nvPr>
-        </p:nvSpPr>
-        <p:spPr/>
-        <p:txBody>
-          <a:bodyPr/>
-          <a:lstStyle/>
-          <a:p>
-            <a:endParaRPr lang="en-US"/>
-          </a:p>
-        </p:txBody>
-      </p:sp>
-      <p:pic>
-        <p:nvPicPr>
-          <p:cNvPr id="4" name="Picture 3"/>
-          <p:cNvPicPr>
-            <a:picLocks noChangeAspect="1"/>
-          </p:cNvPicPr>
-          <p:nvPr/>
-        </p:nvPicPr>
-        <p:blipFill>
-          <a:blip r:embed="rId2"/>
-          <a:stretch>
-            <a:fillRect/>
-          </a:stretch>
-        </p:blipFill>
-        <p:spPr>
-          <a:xfrm>
-            <a:off x="2000250" y="0"/>
-            <a:ext cx="5143500" cy="6858000"/>
-          </a:xfrm>
-          <a:prstGeom prst="rect">
-            <a:avLst/>
-          </a:prstGeom>
-        </p:spPr>
-      </p:pic>
-    </p:spTree>
-    <p:extLst>
-      <p:ext uri="{BB962C8B-B14F-4D97-AF65-F5344CB8AC3E}">
-        <p14:creationId xmlns:p14="http://schemas.microsoft.com/office/powerpoint/2010/main" val="1415314910"/>
-      </p:ext>
-    </p:extLst>
-  </p:cSld>
-  <p:clrMapOvr>
-    <a:masterClrMapping/>
-  </p:clrMapOvr>
-</p:sld>
-</file>
-
-<file path=ppt/slides/slide9.xml><?xml version="1.0" encoding="utf-8"?>
-<p:sld xmlns:a="http://schemas.openxmlformats.org/drawingml/2006/main" xmlns:r="http://schemas.openxmlformats.org/officeDocument/2006/relationships" xmlns:p="http://schemas.openxmlformats.org/presentationml/2006/main">
-  <p:cSld>
-    <p:spTree>
-      <p:nvGrpSpPr>
-        <p:cNvPr id="1" name=""/>
-        <p:cNvGrpSpPr/>
-        <p:nvPr/>
-      </p:nvGrpSpPr>
-      <p:grpSpPr>
-        <a:xfrm>
-          <a:off x="0" y="0"/>
-          <a:ext cx="0" cy="0"/>
-          <a:chOff x="0" y="0"/>
-          <a:chExt cx="0" cy="0"/>
-        </a:xfrm>
-      </p:grpSpPr>
-      <p:sp>
-        <p:nvSpPr>
-          <p:cNvPr id="2" name="Title 1"/>
-          <p:cNvSpPr>
-            <a:spLocks noGrp="1"/>
-          </p:cNvSpPr>
-          <p:nvPr>
-            <p:ph type="title"/>
-          </p:nvPr>
-        </p:nvSpPr>
-        <p:spPr/>
-        <p:txBody>
-          <a:bodyPr/>
-          <a:lstStyle/>
-          <a:p>
-            <a:r>
-              <a:rPr lang="en-US" dirty="0" smtClean="0"/>
               <a:t>Why do I need version control?</a:t>
             </a:r>
             <a:endParaRPr lang="en-US" dirty="0"/>
@@ -9101,7 +8537,7 @@
           <a:effectLst/>
           <a:extLst>
             <a:ext uri="{AF507438-7753-43e0-B8FC-AC1667EBCBE1}">
-              <a14:hiddenEffects xmlns:a14="http://schemas.microsoft.com/office/drawing/2010/main" xmlns="">
+              <a14:hiddenEffects xmlns="" xmlns:a14="http://schemas.microsoft.com/office/drawing/2010/main">
                 <a:effectLst>
                   <a:outerShdw blurRad="63500" dist="38099" dir="2700000" algn="ctr" rotWithShape="0">
                     <a:schemeClr val="bg2">
@@ -9199,6 +8635,251 @@
       </p:par>
     </p:tnLst>
   </p:timing>
+</p:sld>
+</file>
+
+<file path=ppt/slides/slide8.xml><?xml version="1.0" encoding="utf-8"?>
+<p:sld xmlns:a="http://schemas.openxmlformats.org/drawingml/2006/main" xmlns:r="http://schemas.openxmlformats.org/officeDocument/2006/relationships" xmlns:p="http://schemas.openxmlformats.org/presentationml/2006/main">
+  <p:cSld>
+    <p:spTree>
+      <p:nvGrpSpPr>
+        <p:cNvPr id="1" name=""/>
+        <p:cNvGrpSpPr/>
+        <p:nvPr/>
+      </p:nvGrpSpPr>
+      <p:grpSpPr>
+        <a:xfrm>
+          <a:off x="0" y="0"/>
+          <a:ext cx="0" cy="0"/>
+          <a:chOff x="0" y="0"/>
+          <a:chExt cx="0" cy="0"/>
+        </a:xfrm>
+      </p:grpSpPr>
+      <p:sp>
+        <p:nvSpPr>
+          <p:cNvPr id="2" name="Title 1"/>
+          <p:cNvSpPr>
+            <a:spLocks noGrp="1"/>
+          </p:cNvSpPr>
+          <p:nvPr>
+            <p:ph type="title"/>
+          </p:nvPr>
+        </p:nvSpPr>
+        <p:spPr/>
+        <p:txBody>
+          <a:bodyPr/>
+          <a:lstStyle/>
+          <a:p>
+            <a:r>
+              <a:rPr lang="en-US" dirty="0" smtClean="0"/>
+              <a:t>Why do I need version control?</a:t>
+            </a:r>
+            <a:endParaRPr lang="en-US" dirty="0"/>
+          </a:p>
+        </p:txBody>
+      </p:sp>
+      <p:sp>
+        <p:nvSpPr>
+          <p:cNvPr id="3" name="Content Placeholder 2"/>
+          <p:cNvSpPr>
+            <a:spLocks noGrp="1"/>
+          </p:cNvSpPr>
+          <p:nvPr>
+            <p:ph idx="1"/>
+          </p:nvPr>
+        </p:nvSpPr>
+        <p:spPr/>
+        <p:txBody>
+          <a:bodyPr/>
+          <a:lstStyle/>
+          <a:p>
+            <a:pPr>
+              <a:spcBef>
+                <a:spcPts val="800"/>
+              </a:spcBef>
+              <a:buFont typeface="Arial" charset="0"/>
+              <a:buChar char="•"/>
+              <a:defRPr/>
+            </a:pPr>
+            <a:r>
+              <a:rPr lang="en-US" dirty="0">
+                <a:latin typeface="Calibri" charset="0"/>
+              </a:rPr>
+              <a:t>You are developing software with other people</a:t>
+            </a:r>
+          </a:p>
+          <a:p>
+            <a:pPr lvl="1">
+              <a:spcBef>
+                <a:spcPts val="800"/>
+              </a:spcBef>
+              <a:buFont typeface="Arial" charset="0"/>
+              <a:buChar char="•"/>
+              <a:defRPr/>
+            </a:pPr>
+            <a:r>
+              <a:rPr lang="en-US" sz="3200" dirty="0">
+                <a:latin typeface="Calibri" charset="0"/>
+              </a:rPr>
+              <a:t>You want to be able to identify and resolve conflicts during code development</a:t>
+            </a:r>
+          </a:p>
+          <a:p>
+            <a:pPr lvl="2">
+              <a:spcBef>
+                <a:spcPts val="800"/>
+              </a:spcBef>
+              <a:buFont typeface="Arial" charset="0"/>
+              <a:buChar char="•"/>
+              <a:defRPr/>
+            </a:pPr>
+            <a:r>
+              <a:rPr lang="en-US" sz="3200" dirty="0">
+                <a:latin typeface="Calibri" charset="0"/>
+              </a:rPr>
+              <a:t>Two people working on the same function at the same time</a:t>
+            </a:r>
+          </a:p>
+          <a:p>
+            <a:pPr lvl="1">
+              <a:spcBef>
+                <a:spcPts val="800"/>
+              </a:spcBef>
+              <a:buFont typeface="Arial" charset="0"/>
+              <a:buChar char="•"/>
+              <a:defRPr/>
+            </a:pPr>
+            <a:r>
+              <a:rPr lang="en-US" sz="3200" dirty="0">
+                <a:latin typeface="Calibri" charset="0"/>
+              </a:rPr>
+              <a:t>You need to be able to identify who is responsible for what pieces of code</a:t>
+            </a:r>
+          </a:p>
+          <a:p>
+            <a:pPr lvl="2">
+              <a:spcBef>
+                <a:spcPts val="800"/>
+              </a:spcBef>
+              <a:buFont typeface="Arial" charset="0"/>
+              <a:buChar char="•"/>
+              <a:defRPr/>
+            </a:pPr>
+            <a:endParaRPr lang="en-US" sz="3200" dirty="0">
+              <a:latin typeface="Calibri" charset="0"/>
+            </a:endParaRPr>
+          </a:p>
+          <a:p>
+            <a:endParaRPr lang="en-US" dirty="0"/>
+          </a:p>
+        </p:txBody>
+      </p:sp>
+    </p:spTree>
+    <p:extLst>
+      <p:ext uri="{BB962C8B-B14F-4D97-AF65-F5344CB8AC3E}">
+        <p14:creationId xmlns:p14="http://schemas.microsoft.com/office/powerpoint/2010/main" val="99088052"/>
+      </p:ext>
+    </p:extLst>
+  </p:cSld>
+  <p:clrMapOvr>
+    <a:masterClrMapping/>
+  </p:clrMapOvr>
+</p:sld>
+</file>
+
+<file path=ppt/slides/slide9.xml><?xml version="1.0" encoding="utf-8"?>
+<p:sld xmlns:a="http://schemas.openxmlformats.org/drawingml/2006/main" xmlns:r="http://schemas.openxmlformats.org/officeDocument/2006/relationships" xmlns:p="http://schemas.openxmlformats.org/presentationml/2006/main">
+  <p:cSld>
+    <p:spTree>
+      <p:nvGrpSpPr>
+        <p:cNvPr id="1" name=""/>
+        <p:cNvGrpSpPr/>
+        <p:nvPr/>
+      </p:nvGrpSpPr>
+      <p:grpSpPr>
+        <a:xfrm>
+          <a:off x="0" y="0"/>
+          <a:ext cx="0" cy="0"/>
+          <a:chOff x="0" y="0"/>
+          <a:chExt cx="0" cy="0"/>
+        </a:xfrm>
+      </p:grpSpPr>
+      <p:sp>
+        <p:nvSpPr>
+          <p:cNvPr id="2" name="Title 1"/>
+          <p:cNvSpPr>
+            <a:spLocks noGrp="1"/>
+          </p:cNvSpPr>
+          <p:nvPr>
+            <p:ph type="title"/>
+          </p:nvPr>
+        </p:nvSpPr>
+        <p:spPr/>
+        <p:txBody>
+          <a:bodyPr/>
+          <a:lstStyle/>
+          <a:p>
+            <a:r>
+              <a:rPr lang="en-US" dirty="0" smtClean="0"/>
+              <a:t>Why do I need version control?</a:t>
+            </a:r>
+            <a:endParaRPr lang="en-US" dirty="0"/>
+          </a:p>
+        </p:txBody>
+      </p:sp>
+      <p:sp>
+        <p:nvSpPr>
+          <p:cNvPr id="3" name="Content Placeholder 2"/>
+          <p:cNvSpPr>
+            <a:spLocks noGrp="1"/>
+          </p:cNvSpPr>
+          <p:nvPr>
+            <p:ph idx="1"/>
+          </p:nvPr>
+        </p:nvSpPr>
+        <p:spPr/>
+        <p:txBody>
+          <a:bodyPr/>
+          <a:lstStyle/>
+          <a:p>
+            <a:endParaRPr lang="en-US"/>
+          </a:p>
+        </p:txBody>
+      </p:sp>
+      <p:pic>
+        <p:nvPicPr>
+          <p:cNvPr id="4" name="Picture 3"/>
+          <p:cNvPicPr>
+            <a:picLocks noChangeAspect="1"/>
+          </p:cNvPicPr>
+          <p:nvPr/>
+        </p:nvPicPr>
+        <p:blipFill>
+          <a:blip r:embed="rId2"/>
+          <a:stretch>
+            <a:fillRect/>
+          </a:stretch>
+        </p:blipFill>
+        <p:spPr>
+          <a:xfrm>
+            <a:off x="2254250" y="1747536"/>
+            <a:ext cx="4635500" cy="4762500"/>
+          </a:xfrm>
+          <a:prstGeom prst="rect">
+            <a:avLst/>
+          </a:prstGeom>
+        </p:spPr>
+      </p:pic>
+    </p:spTree>
+    <p:extLst>
+      <p:ext uri="{BB962C8B-B14F-4D97-AF65-F5344CB8AC3E}">
+        <p14:creationId xmlns:p14="http://schemas.microsoft.com/office/powerpoint/2010/main" val="261644260"/>
+      </p:ext>
+    </p:extLst>
+  </p:cSld>
+  <p:clrMapOvr>
+    <a:masterClrMapping/>
+  </p:clrMapOvr>
 </p:sld>
 </file>
 

</xml_diff>